<commit_message>
Update Introduction to Python in Excel.pptx
</commit_message>
<xml_diff>
--- a/Introduction to Python in Excel.pptx
+++ b/Introduction to Python in Excel.pptx
@@ -5,19 +5,22 @@
     <p:sldMasterId id="2147483648" r:id="rId1"/>
   </p:sldMasterIdLst>
   <p:notesMasterIdLst>
-    <p:notesMasterId r:id="rId12"/>
+    <p:notesMasterId r:id="rId15"/>
   </p:notesMasterIdLst>
   <p:sldIdLst>
-    <p:sldId id="256" r:id="rId2"/>
-    <p:sldId id="257" r:id="rId3"/>
-    <p:sldId id="258" r:id="rId4"/>
-    <p:sldId id="259" r:id="rId5"/>
-    <p:sldId id="260" r:id="rId6"/>
-    <p:sldId id="261" r:id="rId7"/>
-    <p:sldId id="262" r:id="rId8"/>
-    <p:sldId id="263" r:id="rId9"/>
-    <p:sldId id="264" r:id="rId10"/>
-    <p:sldId id="265" r:id="rId11"/>
+    <p:sldId id="281" r:id="rId2"/>
+    <p:sldId id="282" r:id="rId3"/>
+    <p:sldId id="330" r:id="rId4"/>
+    <p:sldId id="256" r:id="rId5"/>
+    <p:sldId id="257" r:id="rId6"/>
+    <p:sldId id="258" r:id="rId7"/>
+    <p:sldId id="259" r:id="rId8"/>
+    <p:sldId id="260" r:id="rId9"/>
+    <p:sldId id="261" r:id="rId10"/>
+    <p:sldId id="262" r:id="rId11"/>
+    <p:sldId id="263" r:id="rId12"/>
+    <p:sldId id="329" r:id="rId13"/>
+    <p:sldId id="287" r:id="rId14"/>
   </p:sldIdLst>
   <p:sldSz cx="12192000" cy="6858000"/>
   <p:notesSz cx="6858000" cy="9144000"/>
@@ -116,6 +119,11 @@
       </a:defRPr>
     </a:lvl9pPr>
   </p:defaultTextStyle>
+  <p:extLst>
+    <p:ext uri="{EFAFB233-063F-42B5-8137-9DF3F51BA10A}">
+      <p15:sldGuideLst xmlns:p15="http://schemas.microsoft.com/office/powerpoint/2012/main"/>
+    </p:ext>
+  </p:extLst>
 </p:presentation>
 </file>
 
@@ -201,7 +209,7 @@
           <a:p>
             <a:fld id="{F3E3A7AD-606C-46B5-B6F3-AAB2342915D4}" type="datetimeFigureOut">
               <a:rPr lang="en-US" smtClean="0"/>
-              <a:t>4/6/2024</a:t>
+              <a:t>4/25/2024</a:t>
             </a:fld>
             <a:endParaRPr lang="en-US"/>
           </a:p>
@@ -615,7 +623,7 @@
           <a:p>
             <a:fld id="{872B42F6-A528-4218-B860-74D4ACB3AEF2}" type="datetimeFigureOut">
               <a:rPr lang="en-US" smtClean="0"/>
-              <a:t>4/6/2024</a:t>
+              <a:t>4/25/2024</a:t>
             </a:fld>
             <a:endParaRPr lang="en-US"/>
           </a:p>
@@ -813,7 +821,7 @@
           <a:p>
             <a:fld id="{872B42F6-A528-4218-B860-74D4ACB3AEF2}" type="datetimeFigureOut">
               <a:rPr lang="en-US" smtClean="0"/>
-              <a:t>4/6/2024</a:t>
+              <a:t>4/25/2024</a:t>
             </a:fld>
             <a:endParaRPr lang="en-US"/>
           </a:p>
@@ -1021,7 +1029,7 @@
           <a:p>
             <a:fld id="{872B42F6-A528-4218-B860-74D4ACB3AEF2}" type="datetimeFigureOut">
               <a:rPr lang="en-US" smtClean="0"/>
-              <a:t>4/6/2024</a:t>
+              <a:t>4/25/2024</a:t>
             </a:fld>
             <a:endParaRPr lang="en-US"/>
           </a:p>
@@ -1219,7 +1227,7 @@
           <a:p>
             <a:fld id="{872B42F6-A528-4218-B860-74D4ACB3AEF2}" type="datetimeFigureOut">
               <a:rPr lang="en-US" smtClean="0"/>
-              <a:t>4/6/2024</a:t>
+              <a:t>4/25/2024</a:t>
             </a:fld>
             <a:endParaRPr lang="en-US"/>
           </a:p>
@@ -1494,7 +1502,7 @@
           <a:p>
             <a:fld id="{872B42F6-A528-4218-B860-74D4ACB3AEF2}" type="datetimeFigureOut">
               <a:rPr lang="en-US" smtClean="0"/>
-              <a:t>4/6/2024</a:t>
+              <a:t>4/25/2024</a:t>
             </a:fld>
             <a:endParaRPr lang="en-US"/>
           </a:p>
@@ -1759,7 +1767,7 @@
           <a:p>
             <a:fld id="{872B42F6-A528-4218-B860-74D4ACB3AEF2}" type="datetimeFigureOut">
               <a:rPr lang="en-US" smtClean="0"/>
-              <a:t>4/6/2024</a:t>
+              <a:t>4/25/2024</a:t>
             </a:fld>
             <a:endParaRPr lang="en-US"/>
           </a:p>
@@ -2171,7 +2179,7 @@
           <a:p>
             <a:fld id="{872B42F6-A528-4218-B860-74D4ACB3AEF2}" type="datetimeFigureOut">
               <a:rPr lang="en-US" smtClean="0"/>
-              <a:t>4/6/2024</a:t>
+              <a:t>4/25/2024</a:t>
             </a:fld>
             <a:endParaRPr lang="en-US"/>
           </a:p>
@@ -2312,7 +2320,7 @@
           <a:p>
             <a:fld id="{872B42F6-A528-4218-B860-74D4ACB3AEF2}" type="datetimeFigureOut">
               <a:rPr lang="en-US" smtClean="0"/>
-              <a:t>4/6/2024</a:t>
+              <a:t>4/25/2024</a:t>
             </a:fld>
             <a:endParaRPr lang="en-US"/>
           </a:p>
@@ -2425,7 +2433,7 @@
           <a:p>
             <a:fld id="{872B42F6-A528-4218-B860-74D4ACB3AEF2}" type="datetimeFigureOut">
               <a:rPr lang="en-US" smtClean="0"/>
-              <a:t>4/6/2024</a:t>
+              <a:t>4/25/2024</a:t>
             </a:fld>
             <a:endParaRPr lang="en-US"/>
           </a:p>
@@ -2736,7 +2744,7 @@
           <a:p>
             <a:fld id="{872B42F6-A528-4218-B860-74D4ACB3AEF2}" type="datetimeFigureOut">
               <a:rPr lang="en-US" smtClean="0"/>
-              <a:t>4/6/2024</a:t>
+              <a:t>4/25/2024</a:t>
             </a:fld>
             <a:endParaRPr lang="en-US"/>
           </a:p>
@@ -3024,7 +3032,7 @@
           <a:p>
             <a:fld id="{872B42F6-A528-4218-B860-74D4ACB3AEF2}" type="datetimeFigureOut">
               <a:rPr lang="en-US" smtClean="0"/>
-              <a:t>4/6/2024</a:t>
+              <a:t>4/25/2024</a:t>
             </a:fld>
             <a:endParaRPr lang="en-US"/>
           </a:p>
@@ -3265,7 +3273,7 @@
           <a:p>
             <a:fld id="{872B42F6-A528-4218-B860-74D4ACB3AEF2}" type="datetimeFigureOut">
               <a:rPr lang="en-US" smtClean="0"/>
-              <a:t>4/6/2024</a:t>
+              <a:t>4/25/2024</a:t>
             </a:fld>
             <a:endParaRPr lang="en-US"/>
           </a:p>
@@ -3684,63 +3692,875 @@
       </p:grpSpPr>
       <p:sp>
         <p:nvSpPr>
-          <p:cNvPr id="2" name="Title 1">
-            <a:extLst>
-              <a:ext uri="{FF2B5EF4-FFF2-40B4-BE49-F238E27FC236}">
-                <a16:creationId xmlns:a16="http://schemas.microsoft.com/office/drawing/2014/main" id="{9E900875-D9BF-4CEE-F6E3-6D77D097AF74}"/>
-              </a:ext>
-            </a:extLst>
-          </p:cNvPr>
-          <p:cNvSpPr>
-            <a:spLocks noGrp="1"/>
-          </p:cNvSpPr>
-          <p:nvPr>
-            <p:ph type="ctrTitle"/>
-          </p:nvPr>
-        </p:nvSpPr>
-        <p:spPr/>
-        <p:txBody>
-          <a:bodyPr/>
+          <p:cNvPr id="3" name="object 3"/>
+          <p:cNvSpPr txBox="1"/>
+          <p:nvPr/>
+        </p:nvSpPr>
+        <p:spPr>
+          <a:xfrm>
+            <a:off x="2667000" y="2828927"/>
+            <a:ext cx="6858000" cy="741556"/>
+          </a:xfrm>
+          <a:prstGeom prst="rect">
+            <a:avLst/>
+          </a:prstGeom>
+        </p:spPr>
+        <p:txBody>
+          <a:bodyPr vert="horz" wrap="square" lIns="0" tIns="2864" rIns="0" bIns="0" rtlCol="0">
+            <a:spAutoFit/>
+          </a:bodyPr>
           <a:lstStyle/>
           <a:p>
-            <a:r>
-              <a:rPr lang="en-US" dirty="0"/>
-              <a:t>Introduction to Python in Excel</a:t>
-            </a:r>
-          </a:p>
-        </p:txBody>
-      </p:sp>
-      <p:sp>
-        <p:nvSpPr>
-          <p:cNvPr id="3" name="Subtitle 2">
-            <a:extLst>
-              <a:ext uri="{FF2B5EF4-FFF2-40B4-BE49-F238E27FC236}">
-                <a16:creationId xmlns:a16="http://schemas.microsoft.com/office/drawing/2014/main" id="{E029AB0E-B081-72D8-43A2-2A4F7F4695FB}"/>
-              </a:ext>
-            </a:extLst>
-          </p:cNvPr>
-          <p:cNvSpPr>
-            <a:spLocks noGrp="1"/>
-          </p:cNvSpPr>
-          <p:nvPr>
-            <p:ph type="subTitle" idx="1"/>
-          </p:nvPr>
-        </p:nvSpPr>
-        <p:spPr/>
-        <p:txBody>
-          <a:bodyPr/>
+            <a:pPr marL="3014" marR="1206" indent="3165" algn="ctr" defTabSz="216992">
+              <a:spcBef>
+                <a:spcPts val="23"/>
+              </a:spcBef>
+              <a:defRPr/>
+            </a:pPr>
+            <a:r>
+              <a:rPr lang="en-US" sz="2400" spc="-4" dirty="0">
+                <a:solidFill>
+                  <a:prstClr val="black"/>
+                </a:solidFill>
+                <a:latin typeface="Cambria"/>
+                <a:cs typeface="Cambria"/>
+              </a:rPr>
+              <a:t>Thank you for joining the session, the webinar will begin at 01:00 PM ET as per schedule.</a:t>
+            </a:r>
+            <a:endParaRPr sz="2400" dirty="0">
+              <a:solidFill>
+                <a:prstClr val="black"/>
+              </a:solidFill>
+              <a:latin typeface="Cambria"/>
+              <a:cs typeface="Cambria"/>
+            </a:endParaRPr>
+          </a:p>
+        </p:txBody>
+      </p:sp>
+      <p:sp>
+        <p:nvSpPr>
+          <p:cNvPr id="2" name="object 2"/>
+          <p:cNvSpPr txBox="1">
+            <a:spLocks noGrp="1"/>
+          </p:cNvSpPr>
+          <p:nvPr>
+            <p:ph type="title"/>
+          </p:nvPr>
+        </p:nvSpPr>
+        <p:spPr>
+          <a:xfrm>
+            <a:off x="2667000" y="438091"/>
+            <a:ext cx="6858000" cy="1357413"/>
+          </a:xfrm>
+          <a:prstGeom prst="rect">
+            <a:avLst/>
+          </a:prstGeom>
+        </p:spPr>
+        <p:txBody>
+          <a:bodyPr vert="horz" wrap="square" lIns="0" tIns="3165" rIns="0" bIns="0" rtlCol="0" anchor="ctr">
+            <a:spAutoFit/>
+          </a:bodyPr>
           <a:lstStyle/>
           <a:p>
-            <a:endParaRPr lang="en-US"/>
-          </a:p>
-        </p:txBody>
-      </p:sp>
+            <a:pPr marL="3316">
+              <a:spcBef>
+                <a:spcPts val="25"/>
+              </a:spcBef>
+            </a:pPr>
+            <a:r>
+              <a:rPr sz="4400" u="sng" spc="-2" dirty="0"/>
+              <a:t>Good</a:t>
+            </a:r>
+            <a:r>
+              <a:rPr sz="4400" u="sng" spc="-6" dirty="0"/>
+              <a:t> </a:t>
+            </a:r>
+            <a:r>
+              <a:rPr lang="en-US" sz="4400" u="sng" spc="-6" dirty="0"/>
+              <a:t>D</a:t>
+            </a:r>
+            <a:r>
+              <a:rPr sz="4400" u="sng" spc="-6" dirty="0"/>
+              <a:t>ay</a:t>
+            </a:r>
+            <a:r>
+              <a:rPr sz="4400" u="sng" dirty="0"/>
+              <a:t> Ladies</a:t>
+            </a:r>
+            <a:r>
+              <a:rPr sz="4400" u="sng" spc="-8" dirty="0"/>
+              <a:t> </a:t>
+            </a:r>
+            <a:r>
+              <a:rPr sz="4400" u="sng" spc="-2" dirty="0"/>
+              <a:t>and</a:t>
+            </a:r>
+            <a:r>
+              <a:rPr sz="4400" u="sng" spc="-3" dirty="0"/>
+              <a:t> </a:t>
+            </a:r>
+            <a:r>
+              <a:rPr sz="4400" u="sng" dirty="0"/>
+              <a:t>Gentlemen</a:t>
+            </a:r>
+            <a:endParaRPr sz="4400" b="0" u="sng" dirty="0"/>
+          </a:p>
+        </p:txBody>
+      </p:sp>
+      <p:sp>
+        <p:nvSpPr>
+          <p:cNvPr id="5" name="object 4">
+            <a:extLst>
+              <a:ext uri="{FF2B5EF4-FFF2-40B4-BE49-F238E27FC236}">
+                <a16:creationId xmlns:a16="http://schemas.microsoft.com/office/drawing/2014/main" id="{86EC9FD7-BB77-C72F-7A46-535289B93BA0}"/>
+              </a:ext>
+            </a:extLst>
+          </p:cNvPr>
+          <p:cNvSpPr txBox="1"/>
+          <p:nvPr/>
+        </p:nvSpPr>
+        <p:spPr>
+          <a:xfrm>
+            <a:off x="381001" y="4486086"/>
+            <a:ext cx="11353800" cy="495334"/>
+          </a:xfrm>
+          <a:prstGeom prst="rect">
+            <a:avLst/>
+          </a:prstGeom>
+        </p:spPr>
+        <p:txBody>
+          <a:bodyPr vert="horz" wrap="square" lIns="0" tIns="2864" rIns="0" bIns="0" rtlCol="0">
+            <a:spAutoFit/>
+          </a:bodyPr>
+          <a:lstStyle/>
+          <a:p>
+            <a:pPr marL="3014" marR="1206" algn="ctr" defTabSz="216992">
+              <a:defRPr/>
+            </a:pPr>
+            <a:r>
+              <a:rPr sz="1600" spc="-2" dirty="0">
+                <a:solidFill>
+                  <a:prstClr val="black"/>
+                </a:solidFill>
+                <a:latin typeface="Cambria"/>
+                <a:cs typeface="Cambria"/>
+              </a:rPr>
+              <a:t>During</a:t>
+            </a:r>
+            <a:r>
+              <a:rPr sz="1600" spc="5" dirty="0">
+                <a:solidFill>
+                  <a:prstClr val="black"/>
+                </a:solidFill>
+                <a:latin typeface="Cambria"/>
+                <a:cs typeface="Cambria"/>
+              </a:rPr>
+              <a:t> </a:t>
+            </a:r>
+            <a:r>
+              <a:rPr sz="1600" spc="-3" dirty="0">
+                <a:solidFill>
+                  <a:prstClr val="black"/>
+                </a:solidFill>
+                <a:latin typeface="Cambria"/>
+                <a:cs typeface="Cambria"/>
+              </a:rPr>
+              <a:t>the </a:t>
+            </a:r>
+            <a:r>
+              <a:rPr sz="1600" spc="-2" dirty="0">
+                <a:solidFill>
+                  <a:prstClr val="black"/>
+                </a:solidFill>
+                <a:latin typeface="Cambria"/>
+                <a:cs typeface="Cambria"/>
+              </a:rPr>
+              <a:t>presentation;</a:t>
+            </a:r>
+            <a:r>
+              <a:rPr sz="1600" spc="3" dirty="0">
+                <a:solidFill>
+                  <a:prstClr val="black"/>
+                </a:solidFill>
+                <a:latin typeface="Cambria"/>
+                <a:cs typeface="Cambria"/>
+              </a:rPr>
+              <a:t> </a:t>
+            </a:r>
+            <a:r>
+              <a:rPr sz="1600" spc="-5" dirty="0">
+                <a:solidFill>
+                  <a:prstClr val="black"/>
+                </a:solidFill>
+                <a:latin typeface="Cambria"/>
+                <a:cs typeface="Cambria"/>
+              </a:rPr>
+              <a:t>you</a:t>
+            </a:r>
+            <a:r>
+              <a:rPr lang="en-US" sz="1600" spc="-5" dirty="0">
+                <a:solidFill>
+                  <a:prstClr val="black"/>
+                </a:solidFill>
+                <a:latin typeface="Cambria"/>
+                <a:cs typeface="Cambria"/>
+              </a:rPr>
+              <a:t>r</a:t>
+            </a:r>
+            <a:r>
+              <a:rPr sz="1600" spc="5" dirty="0">
+                <a:solidFill>
+                  <a:prstClr val="black"/>
+                </a:solidFill>
+                <a:latin typeface="Cambria"/>
+                <a:cs typeface="Cambria"/>
+              </a:rPr>
+              <a:t> </a:t>
+            </a:r>
+            <a:r>
+              <a:rPr lang="en-US" sz="1600" spc="-2" dirty="0">
+                <a:solidFill>
+                  <a:prstClr val="black"/>
+                </a:solidFill>
+                <a:latin typeface="Cambria"/>
+                <a:cs typeface="Cambria"/>
+              </a:rPr>
+              <a:t>microphones </a:t>
+            </a:r>
+            <a:r>
+              <a:rPr sz="1600" spc="-3" dirty="0">
+                <a:solidFill>
+                  <a:prstClr val="black"/>
+                </a:solidFill>
+                <a:latin typeface="Cambria"/>
+                <a:cs typeface="Cambria"/>
+              </a:rPr>
+              <a:t>will</a:t>
+            </a:r>
+            <a:r>
+              <a:rPr sz="1600" spc="5" dirty="0">
+                <a:solidFill>
+                  <a:prstClr val="black"/>
+                </a:solidFill>
+                <a:latin typeface="Cambria"/>
+                <a:cs typeface="Cambria"/>
+              </a:rPr>
+              <a:t> </a:t>
+            </a:r>
+            <a:r>
+              <a:rPr sz="1600" spc="-2" dirty="0">
+                <a:solidFill>
+                  <a:prstClr val="black"/>
+                </a:solidFill>
+                <a:latin typeface="Cambria"/>
+                <a:cs typeface="Cambria"/>
+              </a:rPr>
+              <a:t>be</a:t>
+            </a:r>
+            <a:r>
+              <a:rPr sz="1600" spc="-3" dirty="0">
+                <a:solidFill>
+                  <a:prstClr val="black"/>
+                </a:solidFill>
+                <a:latin typeface="Cambria"/>
+                <a:cs typeface="Cambria"/>
+              </a:rPr>
+              <a:t> </a:t>
+            </a:r>
+            <a:r>
+              <a:rPr sz="1600" spc="-2" dirty="0">
+                <a:solidFill>
+                  <a:prstClr val="black"/>
+                </a:solidFill>
+                <a:latin typeface="Cambria"/>
+                <a:cs typeface="Cambria"/>
+              </a:rPr>
+              <a:t>placed</a:t>
+            </a:r>
+            <a:r>
+              <a:rPr sz="1600" dirty="0">
+                <a:solidFill>
+                  <a:prstClr val="black"/>
+                </a:solidFill>
+                <a:latin typeface="Cambria"/>
+                <a:cs typeface="Cambria"/>
+              </a:rPr>
+              <a:t> </a:t>
+            </a:r>
+            <a:r>
+              <a:rPr sz="1600" spc="-2" dirty="0">
+                <a:solidFill>
+                  <a:prstClr val="black"/>
+                </a:solidFill>
+                <a:latin typeface="Cambria"/>
+                <a:cs typeface="Cambria"/>
+              </a:rPr>
+              <a:t>on</a:t>
+            </a:r>
+            <a:r>
+              <a:rPr sz="1600" dirty="0">
+                <a:solidFill>
+                  <a:prstClr val="black"/>
+                </a:solidFill>
+                <a:latin typeface="Cambria"/>
+                <a:cs typeface="Cambria"/>
+              </a:rPr>
+              <a:t> </a:t>
+            </a:r>
+            <a:r>
+              <a:rPr sz="1600" spc="-2" dirty="0">
+                <a:solidFill>
+                  <a:prstClr val="black"/>
+                </a:solidFill>
+                <a:latin typeface="Cambria"/>
+                <a:cs typeface="Cambria"/>
+              </a:rPr>
+              <a:t>mute</a:t>
+            </a:r>
+            <a:r>
+              <a:rPr lang="en-US" sz="1600" spc="-2" dirty="0">
+                <a:solidFill>
+                  <a:prstClr val="black"/>
+                </a:solidFill>
+                <a:latin typeface="Cambria"/>
+                <a:cs typeface="Cambria"/>
+              </a:rPr>
+              <a:t> automatically</a:t>
+            </a:r>
+            <a:r>
+              <a:rPr sz="1600" spc="-2" dirty="0">
+                <a:solidFill>
+                  <a:prstClr val="black"/>
+                </a:solidFill>
+                <a:latin typeface="Cambria"/>
+                <a:cs typeface="Cambria"/>
+              </a:rPr>
+              <a:t>.</a:t>
+            </a:r>
+            <a:r>
+              <a:rPr sz="1600" spc="2" dirty="0">
+                <a:solidFill>
+                  <a:prstClr val="black"/>
+                </a:solidFill>
+                <a:latin typeface="Cambria"/>
+                <a:cs typeface="Cambria"/>
+              </a:rPr>
+              <a:t> </a:t>
+            </a:r>
+            <a:r>
+              <a:rPr sz="1600" spc="-3" dirty="0">
+                <a:solidFill>
+                  <a:prstClr val="black"/>
+                </a:solidFill>
+                <a:latin typeface="Cambria"/>
+                <a:cs typeface="Cambria"/>
+              </a:rPr>
+              <a:t>Please</a:t>
+            </a:r>
+            <a:r>
+              <a:rPr sz="1600" spc="3" dirty="0">
+                <a:solidFill>
+                  <a:prstClr val="black"/>
+                </a:solidFill>
+                <a:latin typeface="Cambria"/>
+                <a:cs typeface="Cambria"/>
+              </a:rPr>
+              <a:t> </a:t>
+            </a:r>
+            <a:r>
+              <a:rPr sz="1600" spc="-3" dirty="0">
+                <a:solidFill>
+                  <a:prstClr val="black"/>
+                </a:solidFill>
+                <a:latin typeface="Cambria"/>
+                <a:cs typeface="Cambria"/>
+              </a:rPr>
+              <a:t>feel</a:t>
+            </a:r>
+            <a:r>
+              <a:rPr sz="1600" spc="3" dirty="0">
+                <a:solidFill>
+                  <a:prstClr val="black"/>
+                </a:solidFill>
+                <a:latin typeface="Cambria"/>
+                <a:cs typeface="Cambria"/>
+              </a:rPr>
+              <a:t> </a:t>
+            </a:r>
+            <a:r>
+              <a:rPr sz="1600" spc="-3" dirty="0">
+                <a:solidFill>
+                  <a:prstClr val="black"/>
+                </a:solidFill>
+                <a:latin typeface="Cambria"/>
+                <a:cs typeface="Cambria"/>
+              </a:rPr>
+              <a:t>free</a:t>
+            </a:r>
+            <a:r>
+              <a:rPr sz="1600" dirty="0">
+                <a:solidFill>
+                  <a:prstClr val="black"/>
+                </a:solidFill>
+                <a:latin typeface="Cambria"/>
+                <a:cs typeface="Cambria"/>
+              </a:rPr>
+              <a:t> </a:t>
+            </a:r>
+            <a:r>
+              <a:rPr sz="1600" spc="-3" dirty="0">
+                <a:solidFill>
+                  <a:prstClr val="black"/>
+                </a:solidFill>
+                <a:latin typeface="Cambria"/>
+                <a:cs typeface="Cambria"/>
+              </a:rPr>
+              <a:t>to</a:t>
+            </a:r>
+            <a:r>
+              <a:rPr sz="1600" dirty="0">
+                <a:solidFill>
+                  <a:prstClr val="black"/>
+                </a:solidFill>
+                <a:latin typeface="Cambria"/>
+                <a:cs typeface="Cambria"/>
+              </a:rPr>
+              <a:t> </a:t>
+            </a:r>
+            <a:r>
+              <a:rPr sz="1600" spc="-2" dirty="0">
+                <a:solidFill>
+                  <a:prstClr val="black"/>
+                </a:solidFill>
+                <a:latin typeface="Cambria"/>
+                <a:cs typeface="Cambria"/>
+              </a:rPr>
+              <a:t>chat</a:t>
+            </a:r>
+            <a:r>
+              <a:rPr sz="1600" dirty="0">
+                <a:solidFill>
+                  <a:prstClr val="black"/>
+                </a:solidFill>
+                <a:latin typeface="Cambria"/>
+                <a:cs typeface="Cambria"/>
+              </a:rPr>
+              <a:t> </a:t>
+            </a:r>
+            <a:r>
+              <a:rPr sz="1600" spc="-3" dirty="0">
+                <a:solidFill>
+                  <a:prstClr val="black"/>
+                </a:solidFill>
+                <a:latin typeface="Cambria"/>
+                <a:cs typeface="Cambria"/>
+              </a:rPr>
+              <a:t>with</a:t>
+            </a:r>
+            <a:r>
+              <a:rPr sz="1600" spc="4" dirty="0">
+                <a:solidFill>
+                  <a:prstClr val="black"/>
+                </a:solidFill>
+                <a:latin typeface="Cambria"/>
+                <a:cs typeface="Cambria"/>
+              </a:rPr>
+              <a:t> </a:t>
+            </a:r>
+            <a:r>
+              <a:rPr sz="1600" spc="-3" dirty="0">
+                <a:solidFill>
+                  <a:prstClr val="black"/>
+                </a:solidFill>
+                <a:latin typeface="Cambria"/>
+                <a:cs typeface="Cambria"/>
+              </a:rPr>
+              <a:t>the </a:t>
+            </a:r>
+            <a:r>
+              <a:rPr sz="1600" spc="-80" dirty="0">
+                <a:solidFill>
+                  <a:prstClr val="black"/>
+                </a:solidFill>
+                <a:latin typeface="Cambria"/>
+                <a:cs typeface="Cambria"/>
+              </a:rPr>
+              <a:t> </a:t>
+            </a:r>
+            <a:r>
+              <a:rPr sz="1600" spc="-2" dirty="0">
+                <a:solidFill>
+                  <a:prstClr val="black"/>
+                </a:solidFill>
+                <a:latin typeface="Cambria"/>
+                <a:cs typeface="Cambria"/>
+              </a:rPr>
+              <a:t>host</a:t>
+            </a:r>
+            <a:r>
+              <a:rPr sz="1600" spc="2" dirty="0">
+                <a:solidFill>
+                  <a:prstClr val="black"/>
+                </a:solidFill>
+                <a:latin typeface="Cambria"/>
+                <a:cs typeface="Cambria"/>
+              </a:rPr>
+              <a:t> </a:t>
+            </a:r>
+            <a:r>
+              <a:rPr sz="1600" spc="-2" dirty="0">
+                <a:solidFill>
+                  <a:prstClr val="black"/>
+                </a:solidFill>
+                <a:latin typeface="Cambria"/>
+                <a:cs typeface="Cambria"/>
+              </a:rPr>
+              <a:t>using</a:t>
+            </a:r>
+            <a:r>
+              <a:rPr sz="1600" spc="4" dirty="0">
+                <a:solidFill>
+                  <a:prstClr val="black"/>
+                </a:solidFill>
+                <a:latin typeface="Cambria"/>
+                <a:cs typeface="Cambria"/>
+              </a:rPr>
+              <a:t> </a:t>
+            </a:r>
+            <a:r>
+              <a:rPr sz="1600" spc="-3" dirty="0">
+                <a:solidFill>
+                  <a:prstClr val="black"/>
+                </a:solidFill>
+                <a:latin typeface="Cambria"/>
+                <a:cs typeface="Cambria"/>
+              </a:rPr>
+              <a:t>the </a:t>
+            </a:r>
+            <a:r>
+              <a:rPr sz="1600" spc="-2" dirty="0">
+                <a:solidFill>
+                  <a:prstClr val="black"/>
+                </a:solidFill>
+                <a:latin typeface="Cambria"/>
+                <a:cs typeface="Cambria"/>
+              </a:rPr>
+              <a:t>chat</a:t>
+            </a:r>
+            <a:r>
+              <a:rPr sz="1600" spc="2" dirty="0">
+                <a:solidFill>
+                  <a:prstClr val="black"/>
+                </a:solidFill>
+                <a:latin typeface="Cambria"/>
+                <a:cs typeface="Cambria"/>
+              </a:rPr>
+              <a:t> </a:t>
+            </a:r>
+            <a:r>
+              <a:rPr sz="1600" spc="-2" dirty="0">
+                <a:solidFill>
+                  <a:prstClr val="black"/>
+                </a:solidFill>
+                <a:latin typeface="Cambria"/>
+                <a:cs typeface="Cambria"/>
+              </a:rPr>
+              <a:t>tool should</a:t>
+            </a:r>
+            <a:r>
+              <a:rPr sz="1600" spc="5" dirty="0">
+                <a:solidFill>
+                  <a:prstClr val="black"/>
+                </a:solidFill>
+                <a:latin typeface="Cambria"/>
+                <a:cs typeface="Cambria"/>
+              </a:rPr>
+              <a:t> </a:t>
+            </a:r>
+            <a:r>
+              <a:rPr sz="1600" spc="-5" dirty="0">
+                <a:solidFill>
+                  <a:prstClr val="black"/>
+                </a:solidFill>
+                <a:latin typeface="Cambria"/>
+                <a:cs typeface="Cambria"/>
+              </a:rPr>
+              <a:t>you</a:t>
+            </a:r>
+            <a:r>
+              <a:rPr sz="1600" spc="6" dirty="0">
+                <a:solidFill>
+                  <a:prstClr val="black"/>
+                </a:solidFill>
+                <a:latin typeface="Cambria"/>
+                <a:cs typeface="Cambria"/>
+              </a:rPr>
+              <a:t> </a:t>
+            </a:r>
+            <a:r>
+              <a:rPr sz="1600" spc="-3" dirty="0">
+                <a:solidFill>
+                  <a:prstClr val="black"/>
+                </a:solidFill>
+                <a:latin typeface="Cambria"/>
+                <a:cs typeface="Cambria"/>
+              </a:rPr>
+              <a:t>need</a:t>
+            </a:r>
+            <a:r>
+              <a:rPr sz="1600" spc="-4" dirty="0">
+                <a:solidFill>
+                  <a:prstClr val="black"/>
+                </a:solidFill>
+                <a:latin typeface="Cambria"/>
+                <a:cs typeface="Cambria"/>
+              </a:rPr>
+              <a:t> </a:t>
+            </a:r>
+            <a:r>
+              <a:rPr sz="1600" spc="-5" dirty="0">
+                <a:solidFill>
+                  <a:prstClr val="black"/>
+                </a:solidFill>
+                <a:latin typeface="Cambria"/>
+                <a:cs typeface="Cambria"/>
+              </a:rPr>
+              <a:t>any</a:t>
+            </a:r>
+            <a:r>
+              <a:rPr sz="1600" spc="4" dirty="0">
+                <a:solidFill>
+                  <a:prstClr val="black"/>
+                </a:solidFill>
+                <a:latin typeface="Cambria"/>
+                <a:cs typeface="Cambria"/>
+              </a:rPr>
+              <a:t> </a:t>
+            </a:r>
+            <a:r>
+              <a:rPr sz="1600" spc="-3" dirty="0">
+                <a:solidFill>
+                  <a:prstClr val="black"/>
+                </a:solidFill>
+                <a:latin typeface="Cambria"/>
+                <a:cs typeface="Cambria"/>
+              </a:rPr>
+              <a:t>assistance.</a:t>
+            </a:r>
+            <a:endParaRPr sz="1600" dirty="0">
+              <a:solidFill>
+                <a:prstClr val="black"/>
+              </a:solidFill>
+              <a:latin typeface="Cambria"/>
+              <a:cs typeface="Cambria"/>
+            </a:endParaRPr>
+          </a:p>
+        </p:txBody>
+      </p:sp>
+      <p:sp>
+        <p:nvSpPr>
+          <p:cNvPr id="4" name="object 4">
+            <a:extLst>
+              <a:ext uri="{FF2B5EF4-FFF2-40B4-BE49-F238E27FC236}">
+                <a16:creationId xmlns:a16="http://schemas.microsoft.com/office/drawing/2014/main" id="{5F552725-DCC1-B6E0-6DCB-C975E4984C40}"/>
+              </a:ext>
+            </a:extLst>
+          </p:cNvPr>
+          <p:cNvSpPr txBox="1"/>
+          <p:nvPr/>
+        </p:nvSpPr>
+        <p:spPr>
+          <a:xfrm>
+            <a:off x="1524000" y="6683313"/>
+            <a:ext cx="9144000" cy="174687"/>
+          </a:xfrm>
+          <a:prstGeom prst="rect">
+            <a:avLst/>
+          </a:prstGeom>
+        </p:spPr>
+        <p:txBody>
+          <a:bodyPr vert="horz" wrap="square" lIns="0" tIns="5358" rIns="0" bIns="0" rtlCol="0">
+            <a:spAutoFit/>
+          </a:bodyPr>
+          <a:lstStyle/>
+          <a:p>
+            <a:pPr marL="5358" algn="ctr" defTabSz="385763">
+              <a:spcBef>
+                <a:spcPts val="42"/>
+              </a:spcBef>
+              <a:defRPr/>
+            </a:pPr>
+            <a:r>
+              <a:rPr sz="1100" b="1" spc="-5" dirty="0">
+                <a:solidFill>
+                  <a:prstClr val="black"/>
+                </a:solidFill>
+                <a:latin typeface="Cambria"/>
+                <a:cs typeface="Cambria"/>
+              </a:rPr>
+              <a:t>Copyrights</a:t>
+            </a:r>
+            <a:r>
+              <a:rPr sz="1100" b="1" spc="-6" dirty="0">
+                <a:solidFill>
+                  <a:prstClr val="black"/>
+                </a:solidFill>
+                <a:latin typeface="Cambria"/>
+                <a:cs typeface="Cambria"/>
+              </a:rPr>
+              <a:t> </a:t>
+            </a:r>
+            <a:r>
+              <a:rPr sz="1100" b="1" dirty="0">
+                <a:solidFill>
+                  <a:prstClr val="black"/>
+                </a:solidFill>
+                <a:latin typeface="Cambria"/>
+                <a:cs typeface="Cambria"/>
+              </a:rPr>
+              <a:t>©</a:t>
+            </a:r>
+            <a:r>
+              <a:rPr sz="1100" b="1" spc="5" dirty="0">
+                <a:solidFill>
+                  <a:prstClr val="black"/>
+                </a:solidFill>
+                <a:latin typeface="Cambria"/>
+                <a:cs typeface="Cambria"/>
+              </a:rPr>
+              <a:t> </a:t>
+            </a:r>
+            <a:r>
+              <a:rPr sz="1100" b="1" spc="2" dirty="0">
+                <a:solidFill>
+                  <a:prstClr val="black"/>
+                </a:solidFill>
+                <a:latin typeface="Cambria"/>
+                <a:cs typeface="Cambria"/>
+              </a:rPr>
+              <a:t> </a:t>
+            </a:r>
+            <a:r>
+              <a:rPr lang="en-US" sz="1100" b="1" spc="-5" dirty="0">
+                <a:solidFill>
+                  <a:prstClr val="black"/>
+                </a:solidFill>
+                <a:latin typeface="Cambria"/>
+                <a:cs typeface="Cambria"/>
+                <a:hlinkClick r:id="rId2"/>
+              </a:rPr>
+              <a:t>ComplianceIQ</a:t>
+            </a:r>
+            <a:r>
+              <a:rPr sz="1100" b="1" spc="-5" dirty="0">
+                <a:solidFill>
+                  <a:prstClr val="black"/>
+                </a:solidFill>
+                <a:latin typeface="Cambria"/>
+                <a:cs typeface="Cambria"/>
+              </a:rPr>
+              <a:t>.</a:t>
+            </a:r>
+            <a:r>
+              <a:rPr sz="1100" b="1" spc="2" dirty="0">
+                <a:solidFill>
+                  <a:prstClr val="black"/>
+                </a:solidFill>
+                <a:latin typeface="Cambria"/>
+                <a:cs typeface="Cambria"/>
+              </a:rPr>
+              <a:t> </a:t>
+            </a:r>
+            <a:r>
+              <a:rPr sz="1100" b="1" spc="-2" dirty="0">
+                <a:solidFill>
+                  <a:prstClr val="black"/>
+                </a:solidFill>
+                <a:latin typeface="Cambria"/>
+                <a:cs typeface="Cambria"/>
+              </a:rPr>
+              <a:t>All</a:t>
+            </a:r>
+            <a:r>
+              <a:rPr sz="1100" b="1" spc="6" dirty="0">
+                <a:solidFill>
+                  <a:prstClr val="black"/>
+                </a:solidFill>
+                <a:latin typeface="Cambria"/>
+                <a:cs typeface="Cambria"/>
+              </a:rPr>
+              <a:t> </a:t>
+            </a:r>
+            <a:r>
+              <a:rPr sz="1100" b="1" spc="-2" dirty="0">
+                <a:solidFill>
+                  <a:prstClr val="black"/>
+                </a:solidFill>
+                <a:latin typeface="Cambria"/>
+                <a:cs typeface="Cambria"/>
+              </a:rPr>
+              <a:t>Rights</a:t>
+            </a:r>
+            <a:r>
+              <a:rPr sz="1100" b="1" dirty="0">
+                <a:solidFill>
+                  <a:prstClr val="black"/>
+                </a:solidFill>
+                <a:latin typeface="Cambria"/>
+                <a:cs typeface="Cambria"/>
+              </a:rPr>
+              <a:t> </a:t>
+            </a:r>
+            <a:r>
+              <a:rPr sz="1100" b="1" spc="-5" dirty="0">
+                <a:solidFill>
+                  <a:prstClr val="black"/>
+                </a:solidFill>
+                <a:latin typeface="Cambria"/>
+                <a:cs typeface="Cambria"/>
+              </a:rPr>
+              <a:t>Reserved</a:t>
+            </a:r>
+            <a:endParaRPr sz="1100" dirty="0">
+              <a:solidFill>
+                <a:prstClr val="black"/>
+              </a:solidFill>
+              <a:latin typeface="Cambria"/>
+              <a:cs typeface="Cambria"/>
+            </a:endParaRPr>
+          </a:p>
+        </p:txBody>
+      </p:sp>
+      <p:pic>
+        <p:nvPicPr>
+          <p:cNvPr id="6" name="object 5">
+            <a:hlinkClick r:id="rId2"/>
+            <a:extLst>
+              <a:ext uri="{FF2B5EF4-FFF2-40B4-BE49-F238E27FC236}">
+                <a16:creationId xmlns:a16="http://schemas.microsoft.com/office/drawing/2014/main" id="{DA9032CF-EBC8-F444-F61D-B0563D4F9EB0}"/>
+              </a:ext>
+            </a:extLst>
+          </p:cNvPr>
+          <p:cNvPicPr/>
+          <p:nvPr/>
+        </p:nvPicPr>
+        <p:blipFill>
+          <a:blip r:embed="rId3" cstate="print"/>
+          <a:stretch>
+            <a:fillRect/>
+          </a:stretch>
+        </p:blipFill>
+        <p:spPr>
+          <a:xfrm>
+            <a:off x="9220201" y="0"/>
+            <a:ext cx="2941320" cy="685800"/>
+          </a:xfrm>
+          <a:prstGeom prst="rect">
+            <a:avLst/>
+          </a:prstGeom>
+        </p:spPr>
+      </p:pic>
     </p:spTree>
-    <p:extLst>
-      <p:ext uri="{BB962C8B-B14F-4D97-AF65-F5344CB8AC3E}">
-        <p14:creationId xmlns:p14="http://schemas.microsoft.com/office/powerpoint/2010/main" val="2861766135"/>
-      </p:ext>
-    </p:extLst>
   </p:cSld>
   <p:clrMapOvr>
     <a:masterClrMapping/>
@@ -3770,15 +4590,15 @@
           <p:cNvPr id="2" name="Title 1">
             <a:extLst>
               <a:ext uri="{FF2B5EF4-FFF2-40B4-BE49-F238E27FC236}">
-                <a16:creationId xmlns:a16="http://schemas.microsoft.com/office/drawing/2014/main" id="{9E900875-D9BF-4CEE-F6E3-6D77D097AF74}"/>
-              </a:ext>
-            </a:extLst>
-          </p:cNvPr>
-          <p:cNvSpPr>
-            <a:spLocks noGrp="1"/>
-          </p:cNvSpPr>
-          <p:nvPr>
-            <p:ph type="ctrTitle"/>
+                <a16:creationId xmlns:a16="http://schemas.microsoft.com/office/drawing/2014/main" id="{C89A86A8-D827-A3FC-3831-049A84BCB902}"/>
+              </a:ext>
+            </a:extLst>
+          </p:cNvPr>
+          <p:cNvSpPr>
+            <a:spLocks noGrp="1"/>
+          </p:cNvSpPr>
+          <p:nvPr>
+            <p:ph type="title"/>
           </p:nvPr>
         </p:nvSpPr>
         <p:spPr/>
@@ -3787,27 +4607,26 @@
           <a:lstStyle/>
           <a:p>
             <a:r>
-              <a:rPr lang="en-US"/>
-              <a:t>Thank you</a:t>
-            </a:r>
-            <a:endParaRPr lang="en-US" dirty="0"/>
-          </a:p>
-        </p:txBody>
-      </p:sp>
-      <p:sp>
-        <p:nvSpPr>
-          <p:cNvPr id="3" name="Subtitle 2">
-            <a:extLst>
-              <a:ext uri="{FF2B5EF4-FFF2-40B4-BE49-F238E27FC236}">
-                <a16:creationId xmlns:a16="http://schemas.microsoft.com/office/drawing/2014/main" id="{E029AB0E-B081-72D8-43A2-2A4F7F4695FB}"/>
-              </a:ext>
-            </a:extLst>
-          </p:cNvPr>
-          <p:cNvSpPr>
-            <a:spLocks noGrp="1"/>
-          </p:cNvSpPr>
-          <p:nvPr>
-            <p:ph type="subTitle" idx="1"/>
+              <a:rPr lang="en-US" dirty="0"/>
+              <a:t>3. There’s more to Python and Excel than Python in Excel</a:t>
+            </a:r>
+          </a:p>
+        </p:txBody>
+      </p:sp>
+      <p:sp>
+        <p:nvSpPr>
+          <p:cNvPr id="3" name="Text Placeholder 2">
+            <a:extLst>
+              <a:ext uri="{FF2B5EF4-FFF2-40B4-BE49-F238E27FC236}">
+                <a16:creationId xmlns:a16="http://schemas.microsoft.com/office/drawing/2014/main" id="{7EAF59A2-2EF5-F223-5C98-977ABC7E3480}"/>
+              </a:ext>
+            </a:extLst>
+          </p:cNvPr>
+          <p:cNvSpPr>
+            <a:spLocks noGrp="1"/>
+          </p:cNvSpPr>
+          <p:nvPr>
+            <p:ph type="body" idx="1"/>
           </p:nvPr>
         </p:nvSpPr>
         <p:spPr/>
@@ -3822,9 +4641,1469 @@
     </p:spTree>
     <p:extLst>
       <p:ext uri="{BB962C8B-B14F-4D97-AF65-F5344CB8AC3E}">
-        <p14:creationId xmlns:p14="http://schemas.microsoft.com/office/powerpoint/2010/main" val="3525848109"/>
+        <p14:creationId xmlns:p14="http://schemas.microsoft.com/office/powerpoint/2010/main" val="3580814116"/>
       </p:ext>
     </p:extLst>
+  </p:cSld>
+  <p:clrMapOvr>
+    <a:masterClrMapping/>
+  </p:clrMapOvr>
+</p:sld>
+</file>
+
+<file path=ppt/slides/slide11.xml><?xml version="1.0" encoding="utf-8"?>
+<p:sld xmlns:a="http://schemas.openxmlformats.org/drawingml/2006/main" xmlns:r="http://schemas.openxmlformats.org/officeDocument/2006/relationships" xmlns:p="http://schemas.openxmlformats.org/presentationml/2006/main">
+  <p:cSld>
+    <p:spTree>
+      <p:nvGrpSpPr>
+        <p:cNvPr id="1" name=""/>
+        <p:cNvGrpSpPr/>
+        <p:nvPr/>
+      </p:nvGrpSpPr>
+      <p:grpSpPr>
+        <a:xfrm>
+          <a:off x="0" y="0"/>
+          <a:ext cx="0" cy="0"/>
+          <a:chOff x="0" y="0"/>
+          <a:chExt cx="0" cy="0"/>
+        </a:xfrm>
+      </p:grpSpPr>
+      <p:sp>
+        <p:nvSpPr>
+          <p:cNvPr id="2" name="Title 1">
+            <a:extLst>
+              <a:ext uri="{FF2B5EF4-FFF2-40B4-BE49-F238E27FC236}">
+                <a16:creationId xmlns:a16="http://schemas.microsoft.com/office/drawing/2014/main" id="{2ED49078-63A5-9100-36B1-07137ED4405E}"/>
+              </a:ext>
+            </a:extLst>
+          </p:cNvPr>
+          <p:cNvSpPr>
+            <a:spLocks noGrp="1"/>
+          </p:cNvSpPr>
+          <p:nvPr>
+            <p:ph type="title"/>
+          </p:nvPr>
+        </p:nvSpPr>
+        <p:spPr/>
+        <p:txBody>
+          <a:bodyPr/>
+          <a:lstStyle/>
+          <a:p>
+            <a:r>
+              <a:rPr lang="en-US" dirty="0"/>
+              <a:t>There’s more to Python and Excel than Python in Excel</a:t>
+            </a:r>
+          </a:p>
+        </p:txBody>
+      </p:sp>
+      <p:sp>
+        <p:nvSpPr>
+          <p:cNvPr id="3" name="Content Placeholder 2">
+            <a:extLst>
+              <a:ext uri="{FF2B5EF4-FFF2-40B4-BE49-F238E27FC236}">
+                <a16:creationId xmlns:a16="http://schemas.microsoft.com/office/drawing/2014/main" id="{854056A9-D9C7-2F36-95B9-B925305854D7}"/>
+              </a:ext>
+            </a:extLst>
+          </p:cNvPr>
+          <p:cNvSpPr>
+            <a:spLocks noGrp="1"/>
+          </p:cNvSpPr>
+          <p:nvPr>
+            <p:ph idx="1"/>
+          </p:nvPr>
+        </p:nvSpPr>
+        <p:spPr/>
+        <p:txBody>
+          <a:bodyPr/>
+          <a:lstStyle/>
+          <a:p>
+            <a:r>
+              <a:rPr lang="en-US" dirty="0"/>
+              <a:t>Python in Excel is all about data analysis, visualization, statistics &amp; ML</a:t>
+            </a:r>
+          </a:p>
+          <a:p>
+            <a:r>
+              <a:rPr lang="en-US" dirty="0"/>
+              <a:t>It lacks Excel automation capabilities</a:t>
+            </a:r>
+          </a:p>
+          <a:p>
+            <a:r>
+              <a:rPr lang="en-US" dirty="0"/>
+              <a:t>You can automate an entire Excel workbook from Python… without opening Excel!</a:t>
+            </a:r>
+          </a:p>
+          <a:p>
+            <a:r>
+              <a:rPr lang="en-US" dirty="0"/>
+              <a:t>File: </a:t>
+            </a:r>
+            <a:r>
+              <a:rPr lang="en-US" dirty="0" err="1"/>
+              <a:t>pae-pie.ipynb</a:t>
+            </a:r>
+            <a:endParaRPr lang="en-US" dirty="0"/>
+          </a:p>
+        </p:txBody>
+      </p:sp>
+    </p:spTree>
+    <p:extLst>
+      <p:ext uri="{BB962C8B-B14F-4D97-AF65-F5344CB8AC3E}">
+        <p14:creationId xmlns:p14="http://schemas.microsoft.com/office/powerpoint/2010/main" val="3454268131"/>
+      </p:ext>
+    </p:extLst>
+  </p:cSld>
+  <p:clrMapOvr>
+    <a:masterClrMapping/>
+  </p:clrMapOvr>
+</p:sld>
+</file>
+
+<file path=ppt/slides/slide12.xml><?xml version="1.0" encoding="utf-8"?>
+<p:sld xmlns:a="http://schemas.openxmlformats.org/drawingml/2006/main" xmlns:r="http://schemas.openxmlformats.org/officeDocument/2006/relationships" xmlns:p="http://schemas.openxmlformats.org/presentationml/2006/main">
+  <p:cSld>
+    <p:spTree>
+      <p:nvGrpSpPr>
+        <p:cNvPr id="1" name=""/>
+        <p:cNvGrpSpPr/>
+        <p:nvPr/>
+      </p:nvGrpSpPr>
+      <p:grpSpPr>
+        <a:xfrm>
+          <a:off x="0" y="0"/>
+          <a:ext cx="0" cy="0"/>
+          <a:chOff x="0" y="0"/>
+          <a:chExt cx="0" cy="0"/>
+        </a:xfrm>
+      </p:grpSpPr>
+      <p:grpSp>
+        <p:nvGrpSpPr>
+          <p:cNvPr id="2" name="object 2"/>
+          <p:cNvGrpSpPr/>
+          <p:nvPr/>
+        </p:nvGrpSpPr>
+        <p:grpSpPr>
+          <a:xfrm>
+            <a:off x="0" y="1"/>
+            <a:ext cx="12115800" cy="6857999"/>
+            <a:chOff x="0" y="0"/>
+            <a:chExt cx="12192000" cy="6858000"/>
+          </a:xfrm>
+        </p:grpSpPr>
+        <p:pic>
+          <p:nvPicPr>
+            <p:cNvPr id="3" name="object 3"/>
+            <p:cNvPicPr/>
+            <p:nvPr/>
+          </p:nvPicPr>
+          <p:blipFill>
+            <a:blip r:embed="rId2" cstate="print"/>
+            <a:stretch>
+              <a:fillRect/>
+            </a:stretch>
+          </p:blipFill>
+          <p:spPr>
+            <a:xfrm>
+              <a:off x="0" y="0"/>
+              <a:ext cx="12192000" cy="6858000"/>
+            </a:xfrm>
+            <a:prstGeom prst="rect">
+              <a:avLst/>
+            </a:prstGeom>
+          </p:spPr>
+        </p:pic>
+        <p:pic>
+          <p:nvPicPr>
+            <p:cNvPr id="4" name="object 4"/>
+            <p:cNvPicPr/>
+            <p:nvPr/>
+          </p:nvPicPr>
+          <p:blipFill>
+            <a:blip r:embed="rId3" cstate="print"/>
+            <a:stretch>
+              <a:fillRect/>
+            </a:stretch>
+          </p:blipFill>
+          <p:spPr>
+            <a:xfrm>
+              <a:off x="6036564" y="3419855"/>
+              <a:ext cx="117346" cy="18287"/>
+            </a:xfrm>
+            <a:prstGeom prst="rect">
+              <a:avLst/>
+            </a:prstGeom>
+          </p:spPr>
+        </p:pic>
+        <p:pic>
+          <p:nvPicPr>
+            <p:cNvPr id="5" name="object 5">
+              <a:hlinkClick r:id="rId4"/>
+            </p:cNvPr>
+            <p:cNvPicPr/>
+            <p:nvPr/>
+          </p:nvPicPr>
+          <p:blipFill>
+            <a:blip r:embed="rId5" cstate="print"/>
+            <a:stretch>
+              <a:fillRect/>
+            </a:stretch>
+          </p:blipFill>
+          <p:spPr>
+            <a:xfrm>
+              <a:off x="9550907" y="164592"/>
+              <a:ext cx="2442972" cy="399288"/>
+            </a:xfrm>
+            <a:prstGeom prst="rect">
+              <a:avLst/>
+            </a:prstGeom>
+          </p:spPr>
+        </p:pic>
+        <p:sp>
+          <p:nvSpPr>
+            <p:cNvPr id="6" name="object 6"/>
+            <p:cNvSpPr/>
+            <p:nvPr/>
+          </p:nvSpPr>
+          <p:spPr>
+            <a:xfrm>
+              <a:off x="0" y="152399"/>
+              <a:ext cx="1310640" cy="685800"/>
+            </a:xfrm>
+            <a:custGeom>
+              <a:avLst/>
+              <a:gdLst/>
+              <a:ahLst/>
+              <a:cxnLst/>
+              <a:rect l="l" t="t" r="r" b="b"/>
+              <a:pathLst>
+                <a:path w="1310640" h="685800">
+                  <a:moveTo>
+                    <a:pt x="406908" y="0"/>
+                  </a:moveTo>
+                  <a:lnTo>
+                    <a:pt x="0" y="0"/>
+                  </a:lnTo>
+                  <a:lnTo>
+                    <a:pt x="0" y="685800"/>
+                  </a:lnTo>
+                  <a:lnTo>
+                    <a:pt x="406908" y="685800"/>
+                  </a:lnTo>
+                  <a:lnTo>
+                    <a:pt x="406908" y="0"/>
+                  </a:lnTo>
+                  <a:close/>
+                </a:path>
+                <a:path w="1310640" h="685800">
+                  <a:moveTo>
+                    <a:pt x="914400" y="0"/>
+                  </a:moveTo>
+                  <a:lnTo>
+                    <a:pt x="609600" y="0"/>
+                  </a:lnTo>
+                  <a:lnTo>
+                    <a:pt x="609600" y="685800"/>
+                  </a:lnTo>
+                  <a:lnTo>
+                    <a:pt x="914400" y="685800"/>
+                  </a:lnTo>
+                  <a:lnTo>
+                    <a:pt x="914400" y="0"/>
+                  </a:lnTo>
+                  <a:close/>
+                </a:path>
+                <a:path w="1310640" h="685800">
+                  <a:moveTo>
+                    <a:pt x="1310627" y="0"/>
+                  </a:moveTo>
+                  <a:lnTo>
+                    <a:pt x="1117092" y="0"/>
+                  </a:lnTo>
+                  <a:lnTo>
+                    <a:pt x="1117092" y="685800"/>
+                  </a:lnTo>
+                  <a:lnTo>
+                    <a:pt x="1310627" y="685800"/>
+                  </a:lnTo>
+                  <a:lnTo>
+                    <a:pt x="1310627" y="0"/>
+                  </a:lnTo>
+                  <a:close/>
+                </a:path>
+              </a:pathLst>
+            </a:custGeom>
+            <a:solidFill>
+              <a:srgbClr val="BEBEBE"/>
+            </a:solidFill>
+          </p:spPr>
+          <p:txBody>
+            <a:bodyPr wrap="square" lIns="0" tIns="0" rIns="0" bIns="0" rtlCol="0"/>
+            <a:lstStyle/>
+            <a:p>
+              <a:pPr defTabSz="685800">
+                <a:defRPr/>
+              </a:pPr>
+              <a:endParaRPr sz="1350">
+                <a:solidFill>
+                  <a:prstClr val="black"/>
+                </a:solidFill>
+                <a:latin typeface="Calibri"/>
+              </a:endParaRPr>
+            </a:p>
+          </p:txBody>
+        </p:sp>
+      </p:grpSp>
+      <p:pic>
+        <p:nvPicPr>
+          <p:cNvPr id="7" name="object 7"/>
+          <p:cNvPicPr/>
+          <p:nvPr/>
+        </p:nvPicPr>
+        <p:blipFill>
+          <a:blip r:embed="rId6" cstate="print"/>
+          <a:stretch>
+            <a:fillRect/>
+          </a:stretch>
+        </p:blipFill>
+        <p:spPr>
+          <a:xfrm>
+            <a:off x="3837333" y="1662320"/>
+            <a:ext cx="4820030" cy="3334877"/>
+          </a:xfrm>
+          <a:prstGeom prst="rect">
+            <a:avLst/>
+          </a:prstGeom>
+          <a:ln>
+            <a:noFill/>
+          </a:ln>
+          <a:effectLst>
+            <a:outerShdw blurRad="149987" dist="250190" dir="8460000" algn="ctr">
+              <a:srgbClr val="000000">
+                <a:alpha val="28000"/>
+              </a:srgbClr>
+            </a:outerShdw>
+          </a:effectLst>
+          <a:scene3d>
+            <a:camera prst="orthographicFront">
+              <a:rot lat="0" lon="0" rev="0"/>
+            </a:camera>
+            <a:lightRig rig="contrasting" dir="t">
+              <a:rot lat="0" lon="0" rev="1500000"/>
+            </a:lightRig>
+          </a:scene3d>
+          <a:sp3d prstMaterial="metal">
+            <a:bevelT w="88900" h="88900"/>
+          </a:sp3d>
+        </p:spPr>
+      </p:pic>
+      <p:sp>
+        <p:nvSpPr>
+          <p:cNvPr id="13" name="object 4">
+            <a:extLst>
+              <a:ext uri="{FF2B5EF4-FFF2-40B4-BE49-F238E27FC236}">
+                <a16:creationId xmlns:a16="http://schemas.microsoft.com/office/drawing/2014/main" id="{39CDECA1-99E5-0A37-12D4-A8C67DBA096D}"/>
+              </a:ext>
+            </a:extLst>
+          </p:cNvPr>
+          <p:cNvSpPr txBox="1"/>
+          <p:nvPr/>
+        </p:nvSpPr>
+        <p:spPr>
+          <a:xfrm>
+            <a:off x="1524002" y="6629401"/>
+            <a:ext cx="9143999" cy="178895"/>
+          </a:xfrm>
+          <a:prstGeom prst="rect">
+            <a:avLst/>
+          </a:prstGeom>
+        </p:spPr>
+        <p:txBody>
+          <a:bodyPr vert="horz" wrap="square" lIns="0" tIns="9525" rIns="0" bIns="0" rtlCol="0">
+            <a:spAutoFit/>
+          </a:bodyPr>
+          <a:lstStyle/>
+          <a:p>
+            <a:pPr marL="9525" algn="ctr" defTabSz="685800">
+              <a:spcBef>
+                <a:spcPts val="75"/>
+              </a:spcBef>
+              <a:defRPr/>
+            </a:pPr>
+            <a:r>
+              <a:rPr sz="1100" b="1" spc="-8" dirty="0">
+                <a:solidFill>
+                  <a:prstClr val="black"/>
+                </a:solidFill>
+                <a:latin typeface="Cambria"/>
+                <a:cs typeface="Cambria"/>
+              </a:rPr>
+              <a:t>Copyrights</a:t>
+            </a:r>
+            <a:r>
+              <a:rPr sz="1100" b="1" spc="-11" dirty="0">
+                <a:solidFill>
+                  <a:prstClr val="black"/>
+                </a:solidFill>
+                <a:latin typeface="Cambria"/>
+                <a:cs typeface="Cambria"/>
+              </a:rPr>
+              <a:t> </a:t>
+            </a:r>
+            <a:r>
+              <a:rPr lang="en-US" sz="1100" b="1" dirty="0">
+                <a:solidFill>
+                  <a:prstClr val="black"/>
+                </a:solidFill>
+                <a:latin typeface="Cambria"/>
+                <a:cs typeface="Cambria"/>
+              </a:rPr>
+              <a:t>©</a:t>
+            </a:r>
+            <a:r>
+              <a:rPr lang="en-US" sz="1100" b="1" spc="8" dirty="0">
+                <a:solidFill>
+                  <a:prstClr val="black"/>
+                </a:solidFill>
+                <a:latin typeface="Cambria"/>
+                <a:cs typeface="Cambria"/>
+              </a:rPr>
+              <a:t> </a:t>
+            </a:r>
+            <a:r>
+              <a:rPr lang="en-US" sz="1100" b="1" spc="-8" dirty="0">
+                <a:solidFill>
+                  <a:schemeClr val="accent1">
+                    <a:lumMod val="75000"/>
+                  </a:schemeClr>
+                </a:solidFill>
+                <a:latin typeface="Cambria"/>
+                <a:cs typeface="Cambria"/>
+                <a:hlinkClick r:id="rId4">
+                  <a:extLst>
+                    <a:ext uri="{A12FA001-AC4F-418D-AE19-62706E023703}">
+                      <ahyp:hlinkClr xmlns:ahyp="http://schemas.microsoft.com/office/drawing/2018/hyperlinkcolor" val="tx"/>
+                    </a:ext>
+                  </a:extLst>
+                </a:hlinkClick>
+              </a:rPr>
+              <a:t>ComplianceIQ</a:t>
+            </a:r>
+            <a:r>
+              <a:rPr sz="1100" b="1" spc="-8" dirty="0">
+                <a:solidFill>
+                  <a:prstClr val="black"/>
+                </a:solidFill>
+                <a:latin typeface="Cambria"/>
+                <a:cs typeface="Cambria"/>
+              </a:rPr>
+              <a:t>.</a:t>
+            </a:r>
+            <a:r>
+              <a:rPr sz="1100" b="1" spc="4" dirty="0">
+                <a:solidFill>
+                  <a:prstClr val="black"/>
+                </a:solidFill>
+                <a:latin typeface="Cambria"/>
+                <a:cs typeface="Cambria"/>
+              </a:rPr>
+              <a:t> </a:t>
+            </a:r>
+            <a:r>
+              <a:rPr lang="en-US" sz="1100" b="1" spc="4" dirty="0">
+                <a:solidFill>
+                  <a:prstClr val="black"/>
+                </a:solidFill>
+                <a:latin typeface="Cambria"/>
+                <a:cs typeface="Cambria"/>
+              </a:rPr>
+              <a:t> </a:t>
+            </a:r>
+            <a:r>
+              <a:rPr sz="1100" b="1" spc="-4" dirty="0">
+                <a:solidFill>
+                  <a:prstClr val="black"/>
+                </a:solidFill>
+                <a:latin typeface="Cambria"/>
+                <a:cs typeface="Cambria"/>
+              </a:rPr>
+              <a:t>All</a:t>
+            </a:r>
+            <a:r>
+              <a:rPr sz="1100" b="1" spc="11" dirty="0">
+                <a:solidFill>
+                  <a:prstClr val="black"/>
+                </a:solidFill>
+                <a:latin typeface="Cambria"/>
+                <a:cs typeface="Cambria"/>
+              </a:rPr>
+              <a:t> </a:t>
+            </a:r>
+            <a:r>
+              <a:rPr sz="1100" b="1" spc="-4" dirty="0">
+                <a:solidFill>
+                  <a:prstClr val="black"/>
+                </a:solidFill>
+                <a:latin typeface="Cambria"/>
+                <a:cs typeface="Cambria"/>
+              </a:rPr>
+              <a:t>Rights</a:t>
+            </a:r>
+            <a:r>
+              <a:rPr sz="1100" b="1" dirty="0">
+                <a:solidFill>
+                  <a:prstClr val="black"/>
+                </a:solidFill>
+                <a:latin typeface="Cambria"/>
+                <a:cs typeface="Cambria"/>
+              </a:rPr>
+              <a:t> </a:t>
+            </a:r>
+            <a:r>
+              <a:rPr sz="1100" b="1" spc="-8" dirty="0">
+                <a:solidFill>
+                  <a:prstClr val="black"/>
+                </a:solidFill>
+                <a:latin typeface="Cambria"/>
+                <a:cs typeface="Cambria"/>
+              </a:rPr>
+              <a:t>Reserved</a:t>
+            </a:r>
+            <a:r>
+              <a:rPr lang="en-US" sz="1100" b="1" spc="-8" dirty="0">
+                <a:solidFill>
+                  <a:prstClr val="black"/>
+                </a:solidFill>
+                <a:latin typeface="Cambria"/>
+                <a:cs typeface="Cambria"/>
+              </a:rPr>
+              <a:t>.</a:t>
+            </a:r>
+            <a:endParaRPr sz="1100" dirty="0">
+              <a:solidFill>
+                <a:prstClr val="black"/>
+              </a:solidFill>
+              <a:latin typeface="Cambria"/>
+              <a:cs typeface="Cambria"/>
+            </a:endParaRPr>
+          </a:p>
+        </p:txBody>
+      </p:sp>
+      <p:pic>
+        <p:nvPicPr>
+          <p:cNvPr id="8" name="object 5">
+            <a:hlinkClick r:id="rId4"/>
+            <a:extLst>
+              <a:ext uri="{FF2B5EF4-FFF2-40B4-BE49-F238E27FC236}">
+                <a16:creationId xmlns:a16="http://schemas.microsoft.com/office/drawing/2014/main" id="{C97492D9-0E95-2A62-9AEA-52E04FAE39D8}"/>
+              </a:ext>
+            </a:extLst>
+          </p:cNvPr>
+          <p:cNvPicPr/>
+          <p:nvPr/>
+        </p:nvPicPr>
+        <p:blipFill>
+          <a:blip r:embed="rId5" cstate="print"/>
+          <a:stretch>
+            <a:fillRect/>
+          </a:stretch>
+        </p:blipFill>
+        <p:spPr>
+          <a:xfrm>
+            <a:off x="9220201" y="0"/>
+            <a:ext cx="2941320" cy="685800"/>
+          </a:xfrm>
+          <a:prstGeom prst="rect">
+            <a:avLst/>
+          </a:prstGeom>
+        </p:spPr>
+      </p:pic>
+    </p:spTree>
+  </p:cSld>
+  <p:clrMapOvr>
+    <a:masterClrMapping/>
+  </p:clrMapOvr>
+</p:sld>
+</file>
+
+<file path=ppt/slides/slide13.xml><?xml version="1.0" encoding="utf-8"?>
+<p:sld xmlns:a="http://schemas.openxmlformats.org/drawingml/2006/main" xmlns:r="http://schemas.openxmlformats.org/officeDocument/2006/relationships" xmlns:p="http://schemas.openxmlformats.org/presentationml/2006/main">
+  <p:cSld>
+    <p:spTree>
+      <p:nvGrpSpPr>
+        <p:cNvPr id="1" name=""/>
+        <p:cNvGrpSpPr/>
+        <p:nvPr/>
+      </p:nvGrpSpPr>
+      <p:grpSpPr>
+        <a:xfrm>
+          <a:off x="0" y="0"/>
+          <a:ext cx="0" cy="0"/>
+          <a:chOff x="0" y="0"/>
+          <a:chExt cx="0" cy="0"/>
+        </a:xfrm>
+      </p:grpSpPr>
+      <p:sp>
+        <p:nvSpPr>
+          <p:cNvPr id="2" name="object 2"/>
+          <p:cNvSpPr txBox="1">
+            <a:spLocks noGrp="1"/>
+          </p:cNvSpPr>
+          <p:nvPr>
+            <p:ph type="title"/>
+          </p:nvPr>
+        </p:nvSpPr>
+        <p:spPr>
+          <a:xfrm>
+            <a:off x="2738424" y="1092453"/>
+            <a:ext cx="6712584" cy="391160"/>
+          </a:xfrm>
+          <a:prstGeom prst="rect">
+            <a:avLst/>
+          </a:prstGeom>
+        </p:spPr>
+        <p:txBody>
+          <a:bodyPr vert="horz" wrap="square" lIns="0" tIns="12700" rIns="0" bIns="0" rtlCol="0">
+            <a:spAutoFit/>
+          </a:bodyPr>
+          <a:lstStyle/>
+          <a:p>
+            <a:pPr marL="12700">
+              <a:spcBef>
+                <a:spcPts val="100"/>
+              </a:spcBef>
+            </a:pPr>
+            <a:r>
+              <a:rPr sz="2400" b="0" spc="-5" dirty="0">
+                <a:latin typeface="Arial MT"/>
+                <a:cs typeface="Arial MT"/>
+              </a:rPr>
+              <a:t>Thank</a:t>
+            </a:r>
+            <a:r>
+              <a:rPr sz="2400" b="0" spc="-15" dirty="0">
+                <a:latin typeface="Arial MT"/>
+                <a:cs typeface="Arial MT"/>
+              </a:rPr>
+              <a:t> </a:t>
+            </a:r>
+            <a:r>
+              <a:rPr sz="2400" b="0" dirty="0">
+                <a:latin typeface="Arial MT"/>
+                <a:cs typeface="Arial MT"/>
+              </a:rPr>
+              <a:t>you</a:t>
+            </a:r>
+            <a:r>
+              <a:rPr sz="2400" b="0" spc="5" dirty="0">
+                <a:latin typeface="Arial MT"/>
+                <a:cs typeface="Arial MT"/>
+              </a:rPr>
+              <a:t> </a:t>
+            </a:r>
+            <a:r>
+              <a:rPr sz="2400" b="0" dirty="0">
+                <a:latin typeface="Arial MT"/>
+                <a:cs typeface="Arial MT"/>
+              </a:rPr>
+              <a:t>very</a:t>
+            </a:r>
+            <a:r>
+              <a:rPr sz="2400" b="0" spc="-5" dirty="0">
+                <a:latin typeface="Arial MT"/>
+                <a:cs typeface="Arial MT"/>
+              </a:rPr>
+              <a:t> </a:t>
+            </a:r>
+            <a:r>
+              <a:rPr sz="2400" b="0" dirty="0">
+                <a:latin typeface="Arial MT"/>
+                <a:cs typeface="Arial MT"/>
+              </a:rPr>
+              <a:t>much</a:t>
+            </a:r>
+            <a:r>
+              <a:rPr sz="2400" b="0" spc="-5" dirty="0">
+                <a:latin typeface="Arial MT"/>
+                <a:cs typeface="Arial MT"/>
+              </a:rPr>
+              <a:t> </a:t>
+            </a:r>
+            <a:r>
+              <a:rPr sz="2400" b="0" dirty="0">
+                <a:latin typeface="Arial MT"/>
+                <a:cs typeface="Arial MT"/>
+              </a:rPr>
+              <a:t>for</a:t>
+            </a:r>
+            <a:r>
+              <a:rPr sz="2400" b="0" spc="-20" dirty="0">
+                <a:latin typeface="Arial MT"/>
+                <a:cs typeface="Arial MT"/>
+              </a:rPr>
+              <a:t> </a:t>
+            </a:r>
+            <a:r>
+              <a:rPr sz="2400" b="0" spc="-5" dirty="0">
+                <a:latin typeface="Arial MT"/>
+                <a:cs typeface="Arial MT"/>
+              </a:rPr>
+              <a:t>joining</a:t>
+            </a:r>
+            <a:r>
+              <a:rPr sz="2400" b="0" spc="25" dirty="0">
+                <a:latin typeface="Arial MT"/>
+                <a:cs typeface="Arial MT"/>
+              </a:rPr>
+              <a:t> </a:t>
+            </a:r>
+            <a:r>
+              <a:rPr sz="2400" b="0" spc="-10" dirty="0">
+                <a:latin typeface="Arial MT"/>
+                <a:cs typeface="Arial MT"/>
+              </a:rPr>
+              <a:t>today’s</a:t>
+            </a:r>
+            <a:r>
+              <a:rPr sz="2400" b="0" spc="5" dirty="0">
+                <a:latin typeface="Arial MT"/>
+                <a:cs typeface="Arial MT"/>
+              </a:rPr>
+              <a:t> </a:t>
+            </a:r>
+            <a:r>
+              <a:rPr sz="2400" b="0" spc="-10" dirty="0">
+                <a:latin typeface="Arial MT"/>
+                <a:cs typeface="Arial MT"/>
+              </a:rPr>
+              <a:t>webinar!!</a:t>
+            </a:r>
+            <a:endParaRPr sz="2400">
+              <a:latin typeface="Arial MT"/>
+              <a:cs typeface="Arial MT"/>
+            </a:endParaRPr>
+          </a:p>
+        </p:txBody>
+      </p:sp>
+      <p:sp>
+        <p:nvSpPr>
+          <p:cNvPr id="3" name="object 3"/>
+          <p:cNvSpPr txBox="1"/>
+          <p:nvPr/>
+        </p:nvSpPr>
+        <p:spPr>
+          <a:xfrm>
+            <a:off x="1774953" y="1969973"/>
+            <a:ext cx="8637905" cy="3684904"/>
+          </a:xfrm>
+          <a:prstGeom prst="rect">
+            <a:avLst/>
+          </a:prstGeom>
+        </p:spPr>
+        <p:txBody>
+          <a:bodyPr vert="horz" wrap="square" lIns="0" tIns="12700" rIns="0" bIns="0" rtlCol="0">
+            <a:spAutoFit/>
+          </a:bodyPr>
+          <a:lstStyle/>
+          <a:p>
+            <a:pPr algn="ctr">
+              <a:spcBef>
+                <a:spcPts val="100"/>
+              </a:spcBef>
+            </a:pPr>
+            <a:r>
+              <a:rPr sz="2400" spc="-5" dirty="0">
+                <a:latin typeface="Arial MT"/>
+                <a:cs typeface="Arial MT"/>
+              </a:rPr>
+              <a:t>For</a:t>
+            </a:r>
+            <a:r>
+              <a:rPr sz="2400" dirty="0">
+                <a:latin typeface="Arial MT"/>
+                <a:cs typeface="Arial MT"/>
+              </a:rPr>
+              <a:t> more</a:t>
+            </a:r>
+            <a:r>
+              <a:rPr sz="2400" spc="5" dirty="0">
+                <a:latin typeface="Arial MT"/>
+                <a:cs typeface="Arial MT"/>
+              </a:rPr>
+              <a:t> </a:t>
+            </a:r>
+            <a:r>
+              <a:rPr sz="2400" spc="-5" dirty="0">
+                <a:latin typeface="Arial MT"/>
+                <a:cs typeface="Arial MT"/>
+              </a:rPr>
+              <a:t>information</a:t>
+            </a:r>
+            <a:r>
+              <a:rPr sz="2400" spc="15" dirty="0">
+                <a:latin typeface="Arial MT"/>
+                <a:cs typeface="Arial MT"/>
+              </a:rPr>
+              <a:t> </a:t>
+            </a:r>
+            <a:r>
+              <a:rPr sz="2400" dirty="0">
+                <a:latin typeface="Arial MT"/>
+                <a:cs typeface="Arial MT"/>
+              </a:rPr>
+              <a:t>on</a:t>
+            </a:r>
+            <a:r>
+              <a:rPr sz="2400" spc="-5" dirty="0">
+                <a:latin typeface="Arial MT"/>
+                <a:cs typeface="Arial MT"/>
+              </a:rPr>
+              <a:t> </a:t>
+            </a:r>
+            <a:r>
+              <a:rPr sz="2400" dirty="0">
+                <a:latin typeface="Arial MT"/>
+                <a:cs typeface="Arial MT"/>
+              </a:rPr>
+              <a:t>our</a:t>
+            </a:r>
+            <a:r>
+              <a:rPr sz="2400" spc="5" dirty="0">
+                <a:latin typeface="Arial MT"/>
+                <a:cs typeface="Arial MT"/>
+              </a:rPr>
+              <a:t> </a:t>
+            </a:r>
+            <a:r>
+              <a:rPr sz="2400" spc="-5" dirty="0">
+                <a:latin typeface="Arial MT"/>
+                <a:cs typeface="Arial MT"/>
+              </a:rPr>
+              <a:t>upcoming</a:t>
+            </a:r>
+            <a:r>
+              <a:rPr sz="2400" spc="20" dirty="0">
+                <a:latin typeface="Arial MT"/>
+                <a:cs typeface="Arial MT"/>
+              </a:rPr>
+              <a:t> </a:t>
+            </a:r>
+            <a:r>
+              <a:rPr sz="2400" spc="-5" dirty="0">
+                <a:latin typeface="Arial MT"/>
+                <a:cs typeface="Arial MT"/>
+              </a:rPr>
+              <a:t>webinars</a:t>
+            </a:r>
+            <a:r>
+              <a:rPr sz="2400" spc="40" dirty="0">
+                <a:latin typeface="Arial MT"/>
+                <a:cs typeface="Arial MT"/>
+              </a:rPr>
+              <a:t> </a:t>
+            </a:r>
+            <a:r>
+              <a:rPr sz="2400" spc="-5" dirty="0">
+                <a:latin typeface="Arial MT"/>
+                <a:cs typeface="Arial MT"/>
+              </a:rPr>
+              <a:t>please</a:t>
+            </a:r>
+            <a:r>
+              <a:rPr sz="2400" spc="25" dirty="0">
+                <a:latin typeface="Arial MT"/>
+                <a:cs typeface="Arial MT"/>
+              </a:rPr>
+              <a:t> </a:t>
+            </a:r>
+            <a:r>
+              <a:rPr sz="2400" spc="-5" dirty="0">
+                <a:latin typeface="Arial MT"/>
+                <a:cs typeface="Arial MT"/>
+              </a:rPr>
+              <a:t>visit</a:t>
+            </a:r>
+            <a:r>
+              <a:rPr sz="2400" spc="5" dirty="0">
+                <a:latin typeface="Arial MT"/>
+                <a:cs typeface="Arial MT"/>
+              </a:rPr>
+              <a:t> </a:t>
+            </a:r>
+            <a:r>
+              <a:rPr sz="2400" dirty="0">
+                <a:latin typeface="Arial MT"/>
+                <a:cs typeface="Arial MT"/>
+              </a:rPr>
+              <a:t>our</a:t>
+            </a:r>
+            <a:endParaRPr sz="2400">
+              <a:latin typeface="Arial MT"/>
+              <a:cs typeface="Arial MT"/>
+            </a:endParaRPr>
+          </a:p>
+          <a:p>
+            <a:pPr marL="345440" algn="ctr">
+              <a:spcBef>
+                <a:spcPts val="5"/>
+              </a:spcBef>
+            </a:pPr>
+            <a:r>
+              <a:rPr sz="2400" spc="-5" dirty="0">
+                <a:latin typeface="Arial MT"/>
+                <a:cs typeface="Arial MT"/>
+              </a:rPr>
+              <a:t>website;</a:t>
+            </a:r>
+            <a:endParaRPr sz="2400">
+              <a:latin typeface="Arial MT"/>
+              <a:cs typeface="Arial MT"/>
+            </a:endParaRPr>
+          </a:p>
+          <a:p>
+            <a:pPr marL="3245485" marR="2557145" indent="-337185">
+              <a:lnSpc>
+                <a:spcPts val="6909"/>
+              </a:lnSpc>
+              <a:spcBef>
+                <a:spcPts val="325"/>
+              </a:spcBef>
+            </a:pPr>
+            <a:r>
+              <a:rPr sz="2400" u="heavy" spc="-5" dirty="0">
+                <a:solidFill>
+                  <a:srgbClr val="5F5F5F"/>
+                </a:solidFill>
+                <a:uFill>
+                  <a:solidFill>
+                    <a:srgbClr val="5F5F5F"/>
+                  </a:solidFill>
+                </a:uFill>
+                <a:latin typeface="Arial MT"/>
+                <a:cs typeface="Arial MT"/>
+                <a:hlinkClick r:id="rId2"/>
+              </a:rPr>
+              <a:t>w</a:t>
+            </a:r>
+            <a:r>
+              <a:rPr sz="2400" u="heavy" spc="-15" dirty="0">
+                <a:solidFill>
+                  <a:srgbClr val="5F5F5F"/>
+                </a:solidFill>
+                <a:uFill>
+                  <a:solidFill>
+                    <a:srgbClr val="5F5F5F"/>
+                  </a:solidFill>
+                </a:uFill>
+                <a:latin typeface="Arial MT"/>
+                <a:cs typeface="Arial MT"/>
+                <a:hlinkClick r:id="rId2"/>
+              </a:rPr>
+              <a:t>w</a:t>
+            </a:r>
+            <a:r>
+              <a:rPr sz="2400" u="heavy" spc="-145" dirty="0">
+                <a:solidFill>
+                  <a:srgbClr val="5F5F5F"/>
+                </a:solidFill>
+                <a:uFill>
+                  <a:solidFill>
+                    <a:srgbClr val="5F5F5F"/>
+                  </a:solidFill>
+                </a:uFill>
+                <a:latin typeface="Arial MT"/>
+                <a:cs typeface="Arial MT"/>
+                <a:hlinkClick r:id="rId2"/>
+              </a:rPr>
+              <a:t>w</a:t>
+            </a:r>
+            <a:r>
+              <a:rPr sz="2400" u="heavy" dirty="0">
+                <a:solidFill>
+                  <a:srgbClr val="5F5F5F"/>
+                </a:solidFill>
+                <a:uFill>
+                  <a:solidFill>
+                    <a:srgbClr val="5F5F5F"/>
+                  </a:solidFill>
+                </a:uFill>
+                <a:latin typeface="Arial MT"/>
+                <a:cs typeface="Arial MT"/>
+                <a:hlinkClick r:id="rId2"/>
+              </a:rPr>
+              <a:t>.com</a:t>
+            </a:r>
+            <a:r>
+              <a:rPr sz="2400" u="heavy" spc="-5" dirty="0">
+                <a:solidFill>
+                  <a:srgbClr val="5F5F5F"/>
+                </a:solidFill>
+                <a:uFill>
+                  <a:solidFill>
+                    <a:srgbClr val="5F5F5F"/>
+                  </a:solidFill>
+                </a:uFill>
+                <a:latin typeface="Arial MT"/>
+                <a:cs typeface="Arial MT"/>
+                <a:hlinkClick r:id="rId2"/>
+              </a:rPr>
+              <a:t>p</a:t>
+            </a:r>
+            <a:r>
+              <a:rPr sz="2400" u="heavy" spc="-15" dirty="0">
+                <a:solidFill>
+                  <a:srgbClr val="5F5F5F"/>
+                </a:solidFill>
+                <a:uFill>
+                  <a:solidFill>
+                    <a:srgbClr val="5F5F5F"/>
+                  </a:solidFill>
+                </a:uFill>
+                <a:latin typeface="Arial MT"/>
+                <a:cs typeface="Arial MT"/>
+                <a:hlinkClick r:id="rId2"/>
+              </a:rPr>
+              <a:t>l</a:t>
+            </a:r>
+            <a:r>
+              <a:rPr sz="2400" u="heavy" spc="-5" dirty="0">
+                <a:solidFill>
+                  <a:srgbClr val="5F5F5F"/>
+                </a:solidFill>
+                <a:uFill>
+                  <a:solidFill>
+                    <a:srgbClr val="5F5F5F"/>
+                  </a:solidFill>
+                </a:uFill>
+                <a:latin typeface="Arial MT"/>
+                <a:cs typeface="Arial MT"/>
+                <a:hlinkClick r:id="rId2"/>
+              </a:rPr>
+              <a:t>i</a:t>
+            </a:r>
+            <a:r>
+              <a:rPr sz="2400" u="heavy" spc="-15" dirty="0">
+                <a:solidFill>
+                  <a:srgbClr val="5F5F5F"/>
+                </a:solidFill>
+                <a:uFill>
+                  <a:solidFill>
+                    <a:srgbClr val="5F5F5F"/>
+                  </a:solidFill>
+                </a:uFill>
+                <a:latin typeface="Arial MT"/>
+                <a:cs typeface="Arial MT"/>
+                <a:hlinkClick r:id="rId2"/>
+              </a:rPr>
+              <a:t>a</a:t>
+            </a:r>
+            <a:r>
+              <a:rPr sz="2400" u="heavy" spc="-5" dirty="0">
+                <a:solidFill>
+                  <a:srgbClr val="5F5F5F"/>
+                </a:solidFill>
+                <a:uFill>
+                  <a:solidFill>
+                    <a:srgbClr val="5F5F5F"/>
+                  </a:solidFill>
+                </a:uFill>
+                <a:latin typeface="Arial MT"/>
+                <a:cs typeface="Arial MT"/>
+                <a:hlinkClick r:id="rId2"/>
+              </a:rPr>
+              <a:t>ncei</a:t>
+            </a:r>
+            <a:r>
+              <a:rPr sz="2400" u="heavy" spc="-15" dirty="0">
+                <a:solidFill>
+                  <a:srgbClr val="5F5F5F"/>
+                </a:solidFill>
+                <a:uFill>
+                  <a:solidFill>
+                    <a:srgbClr val="5F5F5F"/>
+                  </a:solidFill>
+                </a:uFill>
+                <a:latin typeface="Arial MT"/>
+                <a:cs typeface="Arial MT"/>
+                <a:hlinkClick r:id="rId2"/>
+              </a:rPr>
+              <a:t>q</a:t>
+            </a:r>
+            <a:r>
+              <a:rPr sz="2400" u="heavy" dirty="0">
+                <a:solidFill>
+                  <a:srgbClr val="5F5F5F"/>
+                </a:solidFill>
+                <a:uFill>
+                  <a:solidFill>
+                    <a:srgbClr val="5F5F5F"/>
+                  </a:solidFill>
+                </a:uFill>
+                <a:latin typeface="Arial MT"/>
+                <a:cs typeface="Arial MT"/>
+                <a:hlinkClick r:id="rId2"/>
+              </a:rPr>
+              <a:t>.com </a:t>
+            </a:r>
+            <a:r>
+              <a:rPr sz="2400" dirty="0">
+                <a:solidFill>
+                  <a:srgbClr val="5F5F5F"/>
+                </a:solidFill>
+                <a:latin typeface="Arial MT"/>
+                <a:cs typeface="Arial MT"/>
+              </a:rPr>
+              <a:t> </a:t>
+            </a:r>
+            <a:r>
+              <a:rPr sz="2400" dirty="0">
+                <a:latin typeface="Arial MT"/>
+                <a:cs typeface="Arial MT"/>
+              </a:rPr>
+              <a:t>Or</a:t>
+            </a:r>
+            <a:r>
+              <a:rPr sz="2400" spc="-25" dirty="0">
+                <a:latin typeface="Arial MT"/>
+                <a:cs typeface="Arial MT"/>
+              </a:rPr>
+              <a:t> </a:t>
+            </a:r>
+            <a:r>
+              <a:rPr sz="2400" dirty="0">
+                <a:latin typeface="Arial MT"/>
+                <a:cs typeface="Arial MT"/>
+              </a:rPr>
+              <a:t>contact</a:t>
+            </a:r>
+            <a:r>
+              <a:rPr sz="2400" spc="-10" dirty="0">
+                <a:latin typeface="Arial MT"/>
+                <a:cs typeface="Arial MT"/>
+              </a:rPr>
+              <a:t> </a:t>
+            </a:r>
+            <a:r>
+              <a:rPr sz="2400" spc="-5" dirty="0">
+                <a:latin typeface="Arial MT"/>
+                <a:cs typeface="Arial MT"/>
+              </a:rPr>
+              <a:t>us </a:t>
+            </a:r>
+            <a:r>
+              <a:rPr sz="2400" dirty="0">
+                <a:latin typeface="Arial MT"/>
+                <a:cs typeface="Arial MT"/>
+              </a:rPr>
+              <a:t>at</a:t>
+            </a:r>
+            <a:endParaRPr sz="2400">
+              <a:latin typeface="Arial MT"/>
+              <a:cs typeface="Arial MT"/>
+            </a:endParaRPr>
+          </a:p>
+          <a:p>
+            <a:pPr>
+              <a:spcBef>
+                <a:spcPts val="30"/>
+              </a:spcBef>
+            </a:pPr>
+            <a:endParaRPr sz="2700">
+              <a:latin typeface="Arial MT"/>
+              <a:cs typeface="Arial MT"/>
+            </a:endParaRPr>
+          </a:p>
+          <a:p>
+            <a:pPr marL="3810" algn="ctr"/>
+            <a:r>
+              <a:rPr sz="2400" spc="-70" dirty="0">
+                <a:latin typeface="Arial MT"/>
+                <a:cs typeface="Arial MT"/>
+              </a:rPr>
+              <a:t>Toll</a:t>
+            </a:r>
+            <a:r>
+              <a:rPr sz="2400" spc="-10" dirty="0">
+                <a:latin typeface="Arial MT"/>
+                <a:cs typeface="Arial MT"/>
+              </a:rPr>
+              <a:t> </a:t>
+            </a:r>
+            <a:r>
+              <a:rPr sz="2400" spc="-5" dirty="0">
+                <a:latin typeface="Arial MT"/>
+                <a:cs typeface="Arial MT"/>
+              </a:rPr>
+              <a:t>Free:</a:t>
+            </a:r>
+            <a:r>
+              <a:rPr sz="2400" spc="-10" dirty="0">
+                <a:latin typeface="Arial MT"/>
+                <a:cs typeface="Arial MT"/>
+              </a:rPr>
+              <a:t> </a:t>
+            </a:r>
+            <a:r>
+              <a:rPr sz="2400" spc="-5" dirty="0">
+                <a:latin typeface="Arial MT"/>
+                <a:cs typeface="Arial MT"/>
+              </a:rPr>
+              <a:t>+1-800-498-2906</a:t>
+            </a:r>
+            <a:endParaRPr sz="2400">
+              <a:latin typeface="Arial MT"/>
+              <a:cs typeface="Arial MT"/>
+            </a:endParaRPr>
+          </a:p>
+          <a:p>
+            <a:pPr marL="344805" algn="ctr">
+              <a:spcBef>
+                <a:spcPts val="5"/>
+              </a:spcBef>
+            </a:pPr>
+            <a:r>
+              <a:rPr sz="2400" spc="-5" dirty="0">
+                <a:latin typeface="Arial MT"/>
+                <a:cs typeface="Arial MT"/>
+              </a:rPr>
+              <a:t>Email:</a:t>
+            </a:r>
+            <a:r>
+              <a:rPr sz="2400" spc="10" dirty="0">
+                <a:latin typeface="Arial MT"/>
+                <a:cs typeface="Arial MT"/>
+              </a:rPr>
+              <a:t> </a:t>
+            </a:r>
+            <a:r>
+              <a:rPr sz="2400" spc="-5" dirty="0">
+                <a:latin typeface="Arial MT"/>
+                <a:cs typeface="Arial MT"/>
+                <a:hlinkClick r:id="rId3"/>
+              </a:rPr>
+              <a:t>contactus@complianceiq.com</a:t>
+            </a:r>
+            <a:endParaRPr sz="2400">
+              <a:latin typeface="Arial MT"/>
+              <a:cs typeface="Arial MT"/>
+            </a:endParaRPr>
+          </a:p>
+        </p:txBody>
+      </p:sp>
+      <p:sp>
+        <p:nvSpPr>
+          <p:cNvPr id="6" name="object 4">
+            <a:extLst>
+              <a:ext uri="{FF2B5EF4-FFF2-40B4-BE49-F238E27FC236}">
+                <a16:creationId xmlns:a16="http://schemas.microsoft.com/office/drawing/2014/main" id="{41469920-4B24-4D26-0112-DA979920D925}"/>
+              </a:ext>
+            </a:extLst>
+          </p:cNvPr>
+          <p:cNvSpPr txBox="1"/>
+          <p:nvPr/>
+        </p:nvSpPr>
+        <p:spPr>
+          <a:xfrm>
+            <a:off x="1524002" y="6629401"/>
+            <a:ext cx="9143999" cy="178895"/>
+          </a:xfrm>
+          <a:prstGeom prst="rect">
+            <a:avLst/>
+          </a:prstGeom>
+        </p:spPr>
+        <p:txBody>
+          <a:bodyPr vert="horz" wrap="square" lIns="0" tIns="9525" rIns="0" bIns="0" rtlCol="0">
+            <a:spAutoFit/>
+          </a:bodyPr>
+          <a:lstStyle/>
+          <a:p>
+            <a:pPr marL="9525" algn="ctr" defTabSz="685800">
+              <a:spcBef>
+                <a:spcPts val="75"/>
+              </a:spcBef>
+              <a:defRPr/>
+            </a:pPr>
+            <a:r>
+              <a:rPr sz="1100" b="1" spc="-8" dirty="0">
+                <a:solidFill>
+                  <a:prstClr val="black"/>
+                </a:solidFill>
+                <a:latin typeface="Cambria"/>
+                <a:cs typeface="Cambria"/>
+              </a:rPr>
+              <a:t>Copyrights</a:t>
+            </a:r>
+            <a:r>
+              <a:rPr sz="1100" b="1" spc="-11" dirty="0">
+                <a:solidFill>
+                  <a:prstClr val="black"/>
+                </a:solidFill>
+                <a:latin typeface="Cambria"/>
+                <a:cs typeface="Cambria"/>
+              </a:rPr>
+              <a:t> </a:t>
+            </a:r>
+            <a:r>
+              <a:rPr lang="en-US" sz="1100" b="1" dirty="0">
+                <a:solidFill>
+                  <a:prstClr val="black"/>
+                </a:solidFill>
+                <a:latin typeface="Cambria"/>
+                <a:cs typeface="Cambria"/>
+              </a:rPr>
+              <a:t>©</a:t>
+            </a:r>
+            <a:r>
+              <a:rPr lang="en-US" sz="1100" b="1" spc="8" dirty="0">
+                <a:solidFill>
+                  <a:prstClr val="black"/>
+                </a:solidFill>
+                <a:latin typeface="Cambria"/>
+                <a:cs typeface="Cambria"/>
+              </a:rPr>
+              <a:t> </a:t>
+            </a:r>
+            <a:r>
+              <a:rPr lang="en-US" sz="1100" b="1" spc="-8" dirty="0">
+                <a:solidFill>
+                  <a:prstClr val="black"/>
+                </a:solidFill>
+                <a:latin typeface="Cambria"/>
+                <a:cs typeface="Cambria"/>
+                <a:hlinkClick r:id="rId4"/>
+              </a:rPr>
+              <a:t>ComplianceIQ</a:t>
+            </a:r>
+            <a:r>
+              <a:rPr sz="1100" b="1" spc="-8" dirty="0">
+                <a:solidFill>
+                  <a:prstClr val="black"/>
+                </a:solidFill>
+                <a:latin typeface="Cambria"/>
+                <a:cs typeface="Cambria"/>
+              </a:rPr>
+              <a:t>.</a:t>
+            </a:r>
+            <a:r>
+              <a:rPr sz="1100" b="1" spc="4" dirty="0">
+                <a:solidFill>
+                  <a:prstClr val="black"/>
+                </a:solidFill>
+                <a:latin typeface="Cambria"/>
+                <a:cs typeface="Cambria"/>
+              </a:rPr>
+              <a:t> </a:t>
+            </a:r>
+            <a:r>
+              <a:rPr lang="en-US" sz="1100" b="1" spc="4" dirty="0">
+                <a:solidFill>
+                  <a:prstClr val="black"/>
+                </a:solidFill>
+                <a:latin typeface="Cambria"/>
+                <a:cs typeface="Cambria"/>
+              </a:rPr>
+              <a:t> </a:t>
+            </a:r>
+            <a:r>
+              <a:rPr sz="1100" b="1" spc="-4" dirty="0">
+                <a:solidFill>
+                  <a:prstClr val="black"/>
+                </a:solidFill>
+                <a:latin typeface="Cambria"/>
+                <a:cs typeface="Cambria"/>
+              </a:rPr>
+              <a:t>All</a:t>
+            </a:r>
+            <a:r>
+              <a:rPr sz="1100" b="1" spc="11" dirty="0">
+                <a:solidFill>
+                  <a:prstClr val="black"/>
+                </a:solidFill>
+                <a:latin typeface="Cambria"/>
+                <a:cs typeface="Cambria"/>
+              </a:rPr>
+              <a:t> </a:t>
+            </a:r>
+            <a:r>
+              <a:rPr sz="1100" b="1" spc="-4" dirty="0">
+                <a:solidFill>
+                  <a:prstClr val="black"/>
+                </a:solidFill>
+                <a:latin typeface="Cambria"/>
+                <a:cs typeface="Cambria"/>
+              </a:rPr>
+              <a:t>Rights</a:t>
+            </a:r>
+            <a:r>
+              <a:rPr sz="1100" b="1" dirty="0">
+                <a:solidFill>
+                  <a:prstClr val="black"/>
+                </a:solidFill>
+                <a:latin typeface="Cambria"/>
+                <a:cs typeface="Cambria"/>
+              </a:rPr>
+              <a:t> </a:t>
+            </a:r>
+            <a:r>
+              <a:rPr sz="1100" b="1" spc="-8" dirty="0">
+                <a:solidFill>
+                  <a:prstClr val="black"/>
+                </a:solidFill>
+                <a:latin typeface="Cambria"/>
+                <a:cs typeface="Cambria"/>
+              </a:rPr>
+              <a:t>Reserved</a:t>
+            </a:r>
+            <a:r>
+              <a:rPr lang="en-US" sz="1100" b="1" spc="-8" dirty="0">
+                <a:solidFill>
+                  <a:prstClr val="black"/>
+                </a:solidFill>
+                <a:latin typeface="Cambria"/>
+                <a:cs typeface="Cambria"/>
+              </a:rPr>
+              <a:t>.</a:t>
+            </a:r>
+            <a:endParaRPr sz="1100" dirty="0">
+              <a:solidFill>
+                <a:prstClr val="black"/>
+              </a:solidFill>
+              <a:latin typeface="Cambria"/>
+              <a:cs typeface="Cambria"/>
+            </a:endParaRPr>
+          </a:p>
+        </p:txBody>
+      </p:sp>
+      <p:pic>
+        <p:nvPicPr>
+          <p:cNvPr id="4" name="object 5">
+            <a:hlinkClick r:id="rId4"/>
+            <a:extLst>
+              <a:ext uri="{FF2B5EF4-FFF2-40B4-BE49-F238E27FC236}">
+                <a16:creationId xmlns:a16="http://schemas.microsoft.com/office/drawing/2014/main" id="{70314DE0-3910-042B-8801-10B0CD344113}"/>
+              </a:ext>
+            </a:extLst>
+          </p:cNvPr>
+          <p:cNvPicPr/>
+          <p:nvPr/>
+        </p:nvPicPr>
+        <p:blipFill>
+          <a:blip r:embed="rId5" cstate="print"/>
+          <a:stretch>
+            <a:fillRect/>
+          </a:stretch>
+        </p:blipFill>
+        <p:spPr>
+          <a:xfrm>
+            <a:off x="9220201" y="0"/>
+            <a:ext cx="2941320" cy="685800"/>
+          </a:xfrm>
+          <a:prstGeom prst="rect">
+            <a:avLst/>
+          </a:prstGeom>
+        </p:spPr>
+      </p:pic>
+    </p:spTree>
   </p:cSld>
   <p:clrMapOvr>
     <a:masterClrMapping/>
@@ -3851,81 +6130,641 @@
       </p:grpSpPr>
       <p:sp>
         <p:nvSpPr>
-          <p:cNvPr id="2" name="Title 1">
-            <a:extLst>
-              <a:ext uri="{FF2B5EF4-FFF2-40B4-BE49-F238E27FC236}">
-                <a16:creationId xmlns:a16="http://schemas.microsoft.com/office/drawing/2014/main" id="{2ED49078-63A5-9100-36B1-07137ED4405E}"/>
-              </a:ext>
-            </a:extLst>
-          </p:cNvPr>
-          <p:cNvSpPr>
-            <a:spLocks noGrp="1"/>
-          </p:cNvSpPr>
-          <p:nvPr>
-            <p:ph type="title"/>
-          </p:nvPr>
-        </p:nvSpPr>
-        <p:spPr/>
-        <p:txBody>
-          <a:bodyPr/>
+          <p:cNvPr id="2" name="object 2"/>
+          <p:cNvSpPr/>
+          <p:nvPr/>
+        </p:nvSpPr>
+        <p:spPr>
+          <a:xfrm>
+            <a:off x="2286000" y="2057400"/>
+            <a:ext cx="6172200" cy="1150620"/>
+          </a:xfrm>
+          <a:custGeom>
+            <a:avLst/>
+            <a:gdLst/>
+            <a:ahLst/>
+            <a:cxnLst/>
+            <a:rect l="l" t="t" r="r" b="b"/>
+            <a:pathLst>
+              <a:path w="6172200" h="1150620">
+                <a:moveTo>
+                  <a:pt x="6172200" y="0"/>
+                </a:moveTo>
+                <a:lnTo>
+                  <a:pt x="0" y="0"/>
+                </a:lnTo>
+                <a:lnTo>
+                  <a:pt x="0" y="1150619"/>
+                </a:lnTo>
+                <a:lnTo>
+                  <a:pt x="6172200" y="1150619"/>
+                </a:lnTo>
+                <a:lnTo>
+                  <a:pt x="6172200" y="0"/>
+                </a:lnTo>
+                <a:close/>
+              </a:path>
+            </a:pathLst>
+          </a:custGeom>
+          <a:solidFill>
+            <a:srgbClr val="FFFFFF"/>
+          </a:solidFill>
+        </p:spPr>
+        <p:txBody>
+          <a:bodyPr wrap="square" lIns="0" tIns="0" rIns="0" bIns="0" rtlCol="0"/>
           <a:lstStyle/>
           <a:p>
-            <a:r>
-              <a:rPr lang="en-US" dirty="0"/>
-              <a:t>Objectives for this session</a:t>
-            </a:r>
-          </a:p>
-        </p:txBody>
-      </p:sp>
-      <p:sp>
-        <p:nvSpPr>
-          <p:cNvPr id="3" name="Content Placeholder 2">
-            <a:extLst>
-              <a:ext uri="{FF2B5EF4-FFF2-40B4-BE49-F238E27FC236}">
-                <a16:creationId xmlns:a16="http://schemas.microsoft.com/office/drawing/2014/main" id="{854056A9-D9C7-2F36-95B9-B925305854D7}"/>
-              </a:ext>
-            </a:extLst>
-          </p:cNvPr>
-          <p:cNvSpPr>
-            <a:spLocks noGrp="1"/>
-          </p:cNvSpPr>
-          <p:nvPr>
-            <p:ph idx="1"/>
-          </p:nvPr>
-        </p:nvSpPr>
-        <p:spPr/>
-        <p:txBody>
-          <a:bodyPr/>
+            <a:endParaRPr/>
+          </a:p>
+        </p:txBody>
+      </p:sp>
+      <p:sp>
+        <p:nvSpPr>
+          <p:cNvPr id="3" name="object 3"/>
+          <p:cNvSpPr/>
+          <p:nvPr/>
+        </p:nvSpPr>
+        <p:spPr>
+          <a:xfrm>
+            <a:off x="9753600" y="2057400"/>
+            <a:ext cx="143510" cy="1150620"/>
+          </a:xfrm>
+          <a:custGeom>
+            <a:avLst/>
+            <a:gdLst/>
+            <a:ahLst/>
+            <a:cxnLst/>
+            <a:rect l="l" t="t" r="r" b="b"/>
+            <a:pathLst>
+              <a:path w="143509" h="1150620">
+                <a:moveTo>
+                  <a:pt x="143255" y="0"/>
+                </a:moveTo>
+                <a:lnTo>
+                  <a:pt x="0" y="0"/>
+                </a:lnTo>
+                <a:lnTo>
+                  <a:pt x="0" y="1150619"/>
+                </a:lnTo>
+                <a:lnTo>
+                  <a:pt x="143255" y="1150619"/>
+                </a:lnTo>
+                <a:lnTo>
+                  <a:pt x="143255" y="0"/>
+                </a:lnTo>
+                <a:close/>
+              </a:path>
+            </a:pathLst>
+          </a:custGeom>
+          <a:solidFill>
+            <a:srgbClr val="FFFFFF"/>
+          </a:solidFill>
+        </p:spPr>
+        <p:txBody>
+          <a:bodyPr wrap="square" lIns="0" tIns="0" rIns="0" bIns="0" rtlCol="0"/>
           <a:lstStyle/>
           <a:p>
-            <a:r>
-              <a:rPr lang="en-US" dirty="0"/>
-              <a:t>Understand the Python in Excel environment</a:t>
-            </a:r>
-          </a:p>
-          <a:p>
-            <a:r>
-              <a:rPr lang="en-US" dirty="0"/>
-              <a:t>Create analyses and visualizations that would otherwise be difficult in Excel</a:t>
-            </a:r>
-          </a:p>
-          <a:p>
-            <a:r>
-              <a:rPr lang="en-US" dirty="0"/>
-              <a:t>Explore what is and isn’t possible with current integration</a:t>
-            </a:r>
-          </a:p>
-          <a:p>
-            <a:endParaRPr lang="en-US" dirty="0"/>
-          </a:p>
-        </p:txBody>
-      </p:sp>
+            <a:endParaRPr/>
+          </a:p>
+        </p:txBody>
+      </p:sp>
+      <p:sp>
+        <p:nvSpPr>
+          <p:cNvPr id="4" name="object 4"/>
+          <p:cNvSpPr/>
+          <p:nvPr/>
+        </p:nvSpPr>
+        <p:spPr>
+          <a:xfrm>
+            <a:off x="9319260" y="2057400"/>
+            <a:ext cx="288290" cy="1150620"/>
+          </a:xfrm>
+          <a:custGeom>
+            <a:avLst/>
+            <a:gdLst/>
+            <a:ahLst/>
+            <a:cxnLst/>
+            <a:rect l="l" t="t" r="r" b="b"/>
+            <a:pathLst>
+              <a:path w="288290" h="1150620">
+                <a:moveTo>
+                  <a:pt x="288035" y="0"/>
+                </a:moveTo>
+                <a:lnTo>
+                  <a:pt x="0" y="0"/>
+                </a:lnTo>
+                <a:lnTo>
+                  <a:pt x="0" y="1150619"/>
+                </a:lnTo>
+                <a:lnTo>
+                  <a:pt x="288035" y="1150619"/>
+                </a:lnTo>
+                <a:lnTo>
+                  <a:pt x="288035" y="0"/>
+                </a:lnTo>
+                <a:close/>
+              </a:path>
+            </a:pathLst>
+          </a:custGeom>
+          <a:solidFill>
+            <a:srgbClr val="FFFFFF"/>
+          </a:solidFill>
+        </p:spPr>
+        <p:txBody>
+          <a:bodyPr wrap="square" lIns="0" tIns="0" rIns="0" bIns="0" rtlCol="0"/>
+          <a:lstStyle/>
+          <a:p>
+            <a:endParaRPr/>
+          </a:p>
+        </p:txBody>
+      </p:sp>
+      <p:sp>
+        <p:nvSpPr>
+          <p:cNvPr id="5" name="object 5"/>
+          <p:cNvSpPr/>
+          <p:nvPr/>
+        </p:nvSpPr>
+        <p:spPr>
+          <a:xfrm>
+            <a:off x="8599932" y="2057400"/>
+            <a:ext cx="576580" cy="1150620"/>
+          </a:xfrm>
+          <a:custGeom>
+            <a:avLst/>
+            <a:gdLst/>
+            <a:ahLst/>
+            <a:cxnLst/>
+            <a:rect l="l" t="t" r="r" b="b"/>
+            <a:pathLst>
+              <a:path w="576579" h="1150620">
+                <a:moveTo>
+                  <a:pt x="576072" y="0"/>
+                </a:moveTo>
+                <a:lnTo>
+                  <a:pt x="0" y="0"/>
+                </a:lnTo>
+                <a:lnTo>
+                  <a:pt x="0" y="1150619"/>
+                </a:lnTo>
+                <a:lnTo>
+                  <a:pt x="576072" y="1150619"/>
+                </a:lnTo>
+                <a:lnTo>
+                  <a:pt x="576072" y="0"/>
+                </a:lnTo>
+                <a:close/>
+              </a:path>
+            </a:pathLst>
+          </a:custGeom>
+          <a:solidFill>
+            <a:srgbClr val="FFFFFF"/>
+          </a:solidFill>
+        </p:spPr>
+        <p:txBody>
+          <a:bodyPr wrap="square" lIns="0" tIns="0" rIns="0" bIns="0" rtlCol="0"/>
+          <a:lstStyle/>
+          <a:p>
+            <a:endParaRPr/>
+          </a:p>
+        </p:txBody>
+      </p:sp>
+      <p:pic>
+        <p:nvPicPr>
+          <p:cNvPr id="6" name="object 6"/>
+          <p:cNvPicPr/>
+          <p:nvPr/>
+        </p:nvPicPr>
+        <p:blipFill>
+          <a:blip r:embed="rId2" cstate="print"/>
+          <a:stretch>
+            <a:fillRect/>
+          </a:stretch>
+        </p:blipFill>
+        <p:spPr>
+          <a:xfrm>
+            <a:off x="3429000" y="2154938"/>
+            <a:ext cx="5029200" cy="1045463"/>
+          </a:xfrm>
+          <a:prstGeom prst="rect">
+            <a:avLst/>
+          </a:prstGeom>
+        </p:spPr>
+      </p:pic>
+      <p:sp>
+        <p:nvSpPr>
+          <p:cNvPr id="7" name="object 7"/>
+          <p:cNvSpPr txBox="1"/>
+          <p:nvPr/>
+        </p:nvSpPr>
+        <p:spPr>
+          <a:xfrm>
+            <a:off x="1938410" y="4038601"/>
+            <a:ext cx="5943600" cy="1309974"/>
+          </a:xfrm>
+          <a:prstGeom prst="rect">
+            <a:avLst/>
+          </a:prstGeom>
+        </p:spPr>
+        <p:txBody>
+          <a:bodyPr vert="horz" wrap="square" lIns="0" tIns="12065" rIns="0" bIns="0" rtlCol="0">
+            <a:spAutoFit/>
+          </a:bodyPr>
+          <a:lstStyle/>
+          <a:p>
+            <a:pPr marL="12700" marR="5080">
+              <a:spcBef>
+                <a:spcPts val="95"/>
+              </a:spcBef>
+            </a:pPr>
+            <a:r>
+              <a:rPr lang="en-US" sz="2800" b="1" spc="-40" dirty="0">
+                <a:latin typeface="Calibri"/>
+                <a:cs typeface="Calibri"/>
+              </a:rPr>
+              <a:t>Excel Power Query and PowerPivot</a:t>
+            </a:r>
+          </a:p>
+          <a:p>
+            <a:pPr marL="12700" marR="5080">
+              <a:spcBef>
+                <a:spcPts val="95"/>
+              </a:spcBef>
+            </a:pPr>
+            <a:endParaRPr lang="en-US" sz="2750" dirty="0">
+              <a:latin typeface="Calibri"/>
+              <a:cs typeface="Calibri"/>
+            </a:endParaRPr>
+          </a:p>
+          <a:p>
+            <a:pPr marL="12700"/>
+            <a:r>
+              <a:rPr lang="en-US" sz="2800" b="1" spc="-20" dirty="0">
+                <a:latin typeface="Calibri"/>
+                <a:cs typeface="Calibri"/>
+              </a:rPr>
+              <a:t>Presenter:</a:t>
+            </a:r>
+            <a:r>
+              <a:rPr lang="en-US" sz="2800" b="1" spc="40" dirty="0">
+                <a:latin typeface="Calibri"/>
+                <a:cs typeface="Calibri"/>
+              </a:rPr>
+              <a:t> </a:t>
+            </a:r>
+            <a:r>
+              <a:rPr lang="en-US" sz="2800" b="1" spc="-85" dirty="0">
+                <a:latin typeface="Calibri"/>
+                <a:cs typeface="Calibri"/>
+              </a:rPr>
+              <a:t>George Mount</a:t>
+            </a:r>
+          </a:p>
+        </p:txBody>
+      </p:sp>
+      <p:sp>
+        <p:nvSpPr>
+          <p:cNvPr id="8" name="object 8"/>
+          <p:cNvSpPr txBox="1"/>
+          <p:nvPr/>
+        </p:nvSpPr>
+        <p:spPr>
+          <a:xfrm>
+            <a:off x="9116695" y="762001"/>
+            <a:ext cx="3151505" cy="505267"/>
+          </a:xfrm>
+          <a:prstGeom prst="rect">
+            <a:avLst/>
+          </a:prstGeom>
+        </p:spPr>
+        <p:txBody>
+          <a:bodyPr vert="horz" wrap="square" lIns="0" tIns="12700" rIns="0" bIns="0" rtlCol="0">
+            <a:spAutoFit/>
+          </a:bodyPr>
+          <a:lstStyle/>
+          <a:p>
+            <a:pPr marL="12700">
+              <a:spcBef>
+                <a:spcPts val="100"/>
+              </a:spcBef>
+            </a:pPr>
+            <a:r>
+              <a:rPr sz="1600" b="1" spc="-45" dirty="0">
+                <a:latin typeface="Cambria"/>
+                <a:cs typeface="Cambria"/>
+              </a:rPr>
+              <a:t>Toll</a:t>
+            </a:r>
+            <a:r>
+              <a:rPr sz="1600" b="1" spc="-10" dirty="0">
+                <a:latin typeface="Cambria"/>
+                <a:cs typeface="Cambria"/>
+              </a:rPr>
+              <a:t> </a:t>
+            </a:r>
+            <a:r>
+              <a:rPr sz="1600" b="1" spc="-15" dirty="0">
+                <a:latin typeface="Cambria"/>
+                <a:cs typeface="Cambria"/>
+              </a:rPr>
+              <a:t>Free:</a:t>
+            </a:r>
+            <a:r>
+              <a:rPr sz="1600" b="1" spc="-45" dirty="0">
+                <a:latin typeface="Cambria"/>
+                <a:cs typeface="Cambria"/>
+              </a:rPr>
+              <a:t> </a:t>
+            </a:r>
+            <a:r>
+              <a:rPr sz="1600" b="1" spc="-5" dirty="0">
+                <a:latin typeface="Cambria"/>
+                <a:cs typeface="Cambria"/>
+              </a:rPr>
+              <a:t>+1-800-498-2906</a:t>
+            </a:r>
+            <a:endParaRPr sz="1600" dirty="0">
+              <a:latin typeface="Cambria"/>
+              <a:cs typeface="Cambria"/>
+            </a:endParaRPr>
+          </a:p>
+          <a:p>
+            <a:pPr marL="12700"/>
+            <a:r>
+              <a:rPr sz="1600" b="1" spc="-10" dirty="0">
+                <a:latin typeface="Cambria"/>
+                <a:cs typeface="Cambria"/>
+                <a:hlinkClick r:id="rId3"/>
+              </a:rPr>
+              <a:t>contactus@complianceiq.com</a:t>
+            </a:r>
+            <a:endParaRPr sz="1600" dirty="0">
+              <a:latin typeface="Cambria"/>
+              <a:cs typeface="Cambria"/>
+            </a:endParaRPr>
+          </a:p>
+        </p:txBody>
+      </p:sp>
+      <p:sp>
+        <p:nvSpPr>
+          <p:cNvPr id="11" name="object 4">
+            <a:extLst>
+              <a:ext uri="{FF2B5EF4-FFF2-40B4-BE49-F238E27FC236}">
+                <a16:creationId xmlns:a16="http://schemas.microsoft.com/office/drawing/2014/main" id="{CD1B90BD-06CD-2DA2-C4AA-45EC324456B2}"/>
+              </a:ext>
+            </a:extLst>
+          </p:cNvPr>
+          <p:cNvSpPr txBox="1"/>
+          <p:nvPr/>
+        </p:nvSpPr>
+        <p:spPr>
+          <a:xfrm>
+            <a:off x="1524002" y="6629401"/>
+            <a:ext cx="9143999" cy="178895"/>
+          </a:xfrm>
+          <a:prstGeom prst="rect">
+            <a:avLst/>
+          </a:prstGeom>
+        </p:spPr>
+        <p:txBody>
+          <a:bodyPr vert="horz" wrap="square" lIns="0" tIns="9525" rIns="0" bIns="0" rtlCol="0">
+            <a:spAutoFit/>
+          </a:bodyPr>
+          <a:lstStyle/>
+          <a:p>
+            <a:pPr marL="9525" algn="ctr" defTabSz="685800">
+              <a:spcBef>
+                <a:spcPts val="75"/>
+              </a:spcBef>
+              <a:defRPr/>
+            </a:pPr>
+            <a:r>
+              <a:rPr sz="1100" b="1" spc="-8" dirty="0">
+                <a:solidFill>
+                  <a:prstClr val="black"/>
+                </a:solidFill>
+                <a:latin typeface="Cambria"/>
+                <a:cs typeface="Cambria"/>
+              </a:rPr>
+              <a:t>Copyrights</a:t>
+            </a:r>
+            <a:r>
+              <a:rPr sz="1100" b="1" spc="-11" dirty="0">
+                <a:solidFill>
+                  <a:prstClr val="black"/>
+                </a:solidFill>
+                <a:latin typeface="Cambria"/>
+                <a:cs typeface="Cambria"/>
+              </a:rPr>
+              <a:t> </a:t>
+            </a:r>
+            <a:r>
+              <a:rPr lang="en-US" sz="1100" b="1" dirty="0">
+                <a:solidFill>
+                  <a:prstClr val="black"/>
+                </a:solidFill>
+                <a:latin typeface="Cambria"/>
+                <a:cs typeface="Cambria"/>
+              </a:rPr>
+              <a:t>©</a:t>
+            </a:r>
+            <a:r>
+              <a:rPr lang="en-US" sz="1100" b="1" spc="8" dirty="0">
+                <a:solidFill>
+                  <a:prstClr val="black"/>
+                </a:solidFill>
+                <a:latin typeface="Cambria"/>
+                <a:cs typeface="Cambria"/>
+              </a:rPr>
+              <a:t> </a:t>
+            </a:r>
+            <a:r>
+              <a:rPr lang="en-US" sz="1100" b="1" spc="-8" dirty="0">
+                <a:solidFill>
+                  <a:prstClr val="black"/>
+                </a:solidFill>
+                <a:latin typeface="Cambria"/>
+                <a:cs typeface="Cambria"/>
+                <a:hlinkClick r:id="rId4"/>
+              </a:rPr>
+              <a:t>ComplianceIQ</a:t>
+            </a:r>
+            <a:r>
+              <a:rPr sz="1100" b="1" spc="-8" dirty="0">
+                <a:solidFill>
+                  <a:prstClr val="black"/>
+                </a:solidFill>
+                <a:latin typeface="Cambria"/>
+                <a:cs typeface="Cambria"/>
+              </a:rPr>
+              <a:t>.</a:t>
+            </a:r>
+            <a:r>
+              <a:rPr sz="1100" b="1" spc="4" dirty="0">
+                <a:solidFill>
+                  <a:prstClr val="black"/>
+                </a:solidFill>
+                <a:latin typeface="Cambria"/>
+                <a:cs typeface="Cambria"/>
+              </a:rPr>
+              <a:t> </a:t>
+            </a:r>
+            <a:r>
+              <a:rPr lang="en-US" sz="1100" b="1" spc="4" dirty="0">
+                <a:solidFill>
+                  <a:prstClr val="black"/>
+                </a:solidFill>
+                <a:latin typeface="Cambria"/>
+                <a:cs typeface="Cambria"/>
+              </a:rPr>
+              <a:t> </a:t>
+            </a:r>
+            <a:r>
+              <a:rPr sz="1100" b="1" spc="-4" dirty="0">
+                <a:solidFill>
+                  <a:prstClr val="black"/>
+                </a:solidFill>
+                <a:latin typeface="Cambria"/>
+                <a:cs typeface="Cambria"/>
+              </a:rPr>
+              <a:t>All</a:t>
+            </a:r>
+            <a:r>
+              <a:rPr sz="1100" b="1" spc="11" dirty="0">
+                <a:solidFill>
+                  <a:prstClr val="black"/>
+                </a:solidFill>
+                <a:latin typeface="Cambria"/>
+                <a:cs typeface="Cambria"/>
+              </a:rPr>
+              <a:t> </a:t>
+            </a:r>
+            <a:r>
+              <a:rPr sz="1100" b="1" spc="-4" dirty="0">
+                <a:solidFill>
+                  <a:prstClr val="black"/>
+                </a:solidFill>
+                <a:latin typeface="Cambria"/>
+                <a:cs typeface="Cambria"/>
+              </a:rPr>
+              <a:t>Rights</a:t>
+            </a:r>
+            <a:r>
+              <a:rPr sz="1100" b="1" dirty="0">
+                <a:solidFill>
+                  <a:prstClr val="black"/>
+                </a:solidFill>
+                <a:latin typeface="Cambria"/>
+                <a:cs typeface="Cambria"/>
+              </a:rPr>
+              <a:t> </a:t>
+            </a:r>
+            <a:r>
+              <a:rPr sz="1100" b="1" spc="-8" dirty="0">
+                <a:solidFill>
+                  <a:prstClr val="black"/>
+                </a:solidFill>
+                <a:latin typeface="Cambria"/>
+                <a:cs typeface="Cambria"/>
+              </a:rPr>
+              <a:t>Reserved</a:t>
+            </a:r>
+            <a:r>
+              <a:rPr lang="en-US" sz="1100" b="1" spc="-8" dirty="0">
+                <a:solidFill>
+                  <a:prstClr val="black"/>
+                </a:solidFill>
+                <a:latin typeface="Cambria"/>
+                <a:cs typeface="Cambria"/>
+              </a:rPr>
+              <a:t>.</a:t>
+            </a:r>
+            <a:endParaRPr sz="1100" dirty="0">
+              <a:solidFill>
+                <a:prstClr val="black"/>
+              </a:solidFill>
+              <a:latin typeface="Cambria"/>
+              <a:cs typeface="Cambria"/>
+            </a:endParaRPr>
+          </a:p>
+        </p:txBody>
+      </p:sp>
+      <p:pic>
+        <p:nvPicPr>
+          <p:cNvPr id="9" name="object 5">
+            <a:hlinkClick r:id="rId4"/>
+            <a:extLst>
+              <a:ext uri="{FF2B5EF4-FFF2-40B4-BE49-F238E27FC236}">
+                <a16:creationId xmlns:a16="http://schemas.microsoft.com/office/drawing/2014/main" id="{BB96904F-0B38-CE36-1ABB-5E890CD92BB1}"/>
+              </a:ext>
+            </a:extLst>
+          </p:cNvPr>
+          <p:cNvPicPr/>
+          <p:nvPr/>
+        </p:nvPicPr>
+        <p:blipFill>
+          <a:blip r:embed="rId5" cstate="print"/>
+          <a:stretch>
+            <a:fillRect/>
+          </a:stretch>
+        </p:blipFill>
+        <p:spPr>
+          <a:xfrm>
+            <a:off x="9220201" y="0"/>
+            <a:ext cx="2941320" cy="685800"/>
+          </a:xfrm>
+          <a:prstGeom prst="rect">
+            <a:avLst/>
+          </a:prstGeom>
+        </p:spPr>
+      </p:pic>
+      <p:pic>
+        <p:nvPicPr>
+          <p:cNvPr id="1026" name="Picture 2">
+            <a:extLst>
+              <a:ext uri="{FF2B5EF4-FFF2-40B4-BE49-F238E27FC236}">
+                <a16:creationId xmlns:a16="http://schemas.microsoft.com/office/drawing/2014/main" id="{3C31E995-3638-36C7-C3B6-58D957F70016}"/>
+              </a:ext>
+            </a:extLst>
+          </p:cNvPr>
+          <p:cNvPicPr>
+            <a:picLocks noChangeAspect="1" noChangeArrowheads="1"/>
+          </p:cNvPicPr>
+          <p:nvPr/>
+        </p:nvPicPr>
+        <p:blipFill>
+          <a:blip r:embed="rId6">
+            <a:extLst>
+              <a:ext uri="{28A0092B-C50C-407E-A947-70E740481C1C}">
+                <a14:useLocalDpi xmlns:a14="http://schemas.microsoft.com/office/drawing/2010/main" val="0"/>
+              </a:ext>
+            </a:extLst>
+          </a:blip>
+          <a:srcRect/>
+          <a:stretch>
+            <a:fillRect/>
+          </a:stretch>
+        </p:blipFill>
+        <p:spPr bwMode="auto">
+          <a:xfrm>
+            <a:off x="9220201" y="3429000"/>
+            <a:ext cx="2144267" cy="2144267"/>
+          </a:xfrm>
+          <a:prstGeom prst="rect">
+            <a:avLst/>
+          </a:prstGeom>
+          <a:noFill/>
+          <a:extLst>
+            <a:ext uri="{909E8E84-426E-40DD-AFC4-6F175D3DCCD1}">
+              <a14:hiddenFill xmlns:a14="http://schemas.microsoft.com/office/drawing/2010/main">
+                <a:solidFill>
+                  <a:srgbClr val="FFFFFF"/>
+                </a:solidFill>
+              </a14:hiddenFill>
+            </a:ext>
+          </a:extLst>
+        </p:spPr>
+      </p:pic>
     </p:spTree>
-    <p:extLst>
-      <p:ext uri="{BB962C8B-B14F-4D97-AF65-F5344CB8AC3E}">
-        <p14:creationId xmlns:p14="http://schemas.microsoft.com/office/powerpoint/2010/main" val="3698758899"/>
-      </p:ext>
-    </p:extLst>
   </p:cSld>
   <p:clrMapOvr>
     <a:masterClrMapping/>
@@ -3952,63 +6791,359 @@
       </p:grpSpPr>
       <p:sp>
         <p:nvSpPr>
-          <p:cNvPr id="2" name="Title 1">
-            <a:extLst>
-              <a:ext uri="{FF2B5EF4-FFF2-40B4-BE49-F238E27FC236}">
-                <a16:creationId xmlns:a16="http://schemas.microsoft.com/office/drawing/2014/main" id="{C89A86A8-D827-A3FC-3831-049A84BCB902}"/>
-              </a:ext>
-            </a:extLst>
-          </p:cNvPr>
-          <p:cNvSpPr>
+          <p:cNvPr id="2" name="object 2"/>
+          <p:cNvSpPr txBox="1">
             <a:spLocks noGrp="1"/>
           </p:cNvSpPr>
           <p:nvPr>
             <p:ph type="title"/>
           </p:nvPr>
         </p:nvSpPr>
-        <p:spPr/>
-        <p:txBody>
-          <a:bodyPr/>
+        <p:spPr>
+          <a:xfrm>
+            <a:off x="30478" y="245846"/>
+            <a:ext cx="12161521" cy="628377"/>
+          </a:xfrm>
+          <a:prstGeom prst="rect">
+            <a:avLst/>
+          </a:prstGeom>
+        </p:spPr>
+        <p:txBody>
+          <a:bodyPr vert="horz" wrap="square" lIns="0" tIns="12700" rIns="0" bIns="0" rtlCol="0">
+            <a:spAutoFit/>
+          </a:bodyPr>
           <a:lstStyle/>
           <a:p>
-            <a:r>
-              <a:rPr lang="en-US" dirty="0"/>
-              <a:t>1. Understanding the Python in Excel environment</a:t>
-            </a:r>
-          </a:p>
-        </p:txBody>
-      </p:sp>
-      <p:sp>
-        <p:nvSpPr>
-          <p:cNvPr id="3" name="Text Placeholder 2">
-            <a:extLst>
-              <a:ext uri="{FF2B5EF4-FFF2-40B4-BE49-F238E27FC236}">
-                <a16:creationId xmlns:a16="http://schemas.microsoft.com/office/drawing/2014/main" id="{7EAF59A2-2EF5-F223-5C98-977ABC7E3480}"/>
-              </a:ext>
-            </a:extLst>
-          </p:cNvPr>
-          <p:cNvSpPr>
-            <a:spLocks noGrp="1"/>
-          </p:cNvSpPr>
-          <p:nvPr>
-            <p:ph type="body" idx="1"/>
-          </p:nvPr>
-        </p:nvSpPr>
-        <p:spPr/>
-        <p:txBody>
-          <a:bodyPr/>
+            <a:pPr marL="12700" algn="ctr">
+              <a:spcBef>
+                <a:spcPts val="100"/>
+              </a:spcBef>
+            </a:pPr>
+            <a:r>
+              <a:rPr u="sng" dirty="0"/>
+              <a:t>About</a:t>
+            </a:r>
+            <a:r>
+              <a:rPr u="sng" spc="-30" dirty="0"/>
+              <a:t> </a:t>
+            </a:r>
+            <a:r>
+              <a:rPr u="sng" spc="-5" dirty="0"/>
+              <a:t>The</a:t>
+            </a:r>
+            <a:r>
+              <a:rPr u="sng" spc="-45" dirty="0"/>
+              <a:t> </a:t>
+            </a:r>
+            <a:r>
+              <a:rPr u="sng" spc="-15" dirty="0"/>
+              <a:t>Speaker</a:t>
+            </a:r>
+            <a:endParaRPr u="sng" dirty="0"/>
+          </a:p>
+        </p:txBody>
+      </p:sp>
+      <p:sp>
+        <p:nvSpPr>
+          <p:cNvPr id="4" name="object 4"/>
+          <p:cNvSpPr txBox="1"/>
+          <p:nvPr/>
+        </p:nvSpPr>
+        <p:spPr>
+          <a:xfrm>
+            <a:off x="685800" y="1112050"/>
+            <a:ext cx="10744200" cy="4145750"/>
+          </a:xfrm>
+          <a:prstGeom prst="rect">
+            <a:avLst/>
+          </a:prstGeom>
+        </p:spPr>
+        <p:txBody>
+          <a:bodyPr vert="horz" wrap="square" lIns="0" tIns="12700" rIns="0" bIns="0" rtlCol="0">
+            <a:spAutoFit/>
+          </a:bodyPr>
           <a:lstStyle/>
           <a:p>
-            <a:endParaRPr lang="en-US"/>
-          </a:p>
-        </p:txBody>
-      </p:sp>
+            <a:pPr marL="12700" marR="5080">
+              <a:lnSpc>
+                <a:spcPct val="150000"/>
+              </a:lnSpc>
+              <a:spcBef>
+                <a:spcPts val="100"/>
+              </a:spcBef>
+            </a:pPr>
+            <a:r>
+              <a:rPr lang="en-US" sz="2000" b="1" dirty="0">
+                <a:latin typeface="Calibri"/>
+                <a:cs typeface="Calibri"/>
+              </a:rPr>
+              <a:t>George Mount is the founder and CEO of </a:t>
+            </a:r>
+            <a:r>
+              <a:rPr lang="en-US" sz="2000" b="1" dirty="0" err="1">
+                <a:latin typeface="Calibri"/>
+                <a:cs typeface="Calibri"/>
+              </a:rPr>
+              <a:t>Stringfest</a:t>
+            </a:r>
+            <a:r>
+              <a:rPr lang="en-US" sz="2000" b="1" dirty="0">
+                <a:latin typeface="Calibri"/>
+                <a:cs typeface="Calibri"/>
+              </a:rPr>
+              <a:t> Analytics, a consulting firm specializing in analytics education and upskilling. He has worked with leading bootcamps, learning platforms and practice organizations to help individuals excel at analytics.</a:t>
+            </a:r>
+          </a:p>
+          <a:p>
+            <a:pPr marL="12700" marR="5080">
+              <a:lnSpc>
+                <a:spcPct val="150000"/>
+              </a:lnSpc>
+              <a:spcBef>
+                <a:spcPts val="100"/>
+              </a:spcBef>
+            </a:pPr>
+            <a:r>
+              <a:rPr lang="en-US" sz="2000" b="1" dirty="0">
+                <a:latin typeface="Calibri"/>
+                <a:cs typeface="Calibri"/>
+              </a:rPr>
+              <a:t>George regularly blogs and speaks on data analysis, data education and workforce development and is the author of Advancing into Analytics: From Excel to Python and R (O’Reilly Media, 2021). He is a recipient of the Microsoft Most Valuable Professional (MVP) award for exceptional technical expertise and community advocacy in the field of Excel.</a:t>
+            </a:r>
+          </a:p>
+          <a:p>
+            <a:pPr marL="12700" marR="5080">
+              <a:lnSpc>
+                <a:spcPct val="150000"/>
+              </a:lnSpc>
+              <a:spcBef>
+                <a:spcPts val="100"/>
+              </a:spcBef>
+            </a:pPr>
+            <a:r>
+              <a:rPr lang="en-US" sz="2000" b="1" dirty="0">
+                <a:latin typeface="Calibri"/>
+                <a:cs typeface="Calibri"/>
+              </a:rPr>
+              <a:t>George holds a bachelor’s degree in economics from Hillsdale College and master’s degrees in finance and information systems from Case Western Reserve University. He resides in Cleveland, Ohio.</a:t>
+            </a:r>
+          </a:p>
+        </p:txBody>
+      </p:sp>
+      <p:sp>
+        <p:nvSpPr>
+          <p:cNvPr id="6" name="object 4">
+            <a:extLst>
+              <a:ext uri="{FF2B5EF4-FFF2-40B4-BE49-F238E27FC236}">
+                <a16:creationId xmlns:a16="http://schemas.microsoft.com/office/drawing/2014/main" id="{19F4EA80-A052-5838-AD4C-A16C2F8F3DF8}"/>
+              </a:ext>
+            </a:extLst>
+          </p:cNvPr>
+          <p:cNvSpPr txBox="1"/>
+          <p:nvPr/>
+        </p:nvSpPr>
+        <p:spPr>
+          <a:xfrm>
+            <a:off x="1524002" y="6629401"/>
+            <a:ext cx="9143999" cy="178895"/>
+          </a:xfrm>
+          <a:prstGeom prst="rect">
+            <a:avLst/>
+          </a:prstGeom>
+        </p:spPr>
+        <p:txBody>
+          <a:bodyPr vert="horz" wrap="square" lIns="0" tIns="9525" rIns="0" bIns="0" rtlCol="0">
+            <a:spAutoFit/>
+          </a:bodyPr>
+          <a:lstStyle/>
+          <a:p>
+            <a:pPr marL="9525" algn="ctr" defTabSz="685800">
+              <a:spcBef>
+                <a:spcPts val="75"/>
+              </a:spcBef>
+              <a:defRPr/>
+            </a:pPr>
+            <a:r>
+              <a:rPr sz="1100" b="1" spc="-8" dirty="0">
+                <a:solidFill>
+                  <a:prstClr val="black"/>
+                </a:solidFill>
+                <a:latin typeface="Cambria"/>
+                <a:cs typeface="Cambria"/>
+              </a:rPr>
+              <a:t>Copyrights</a:t>
+            </a:r>
+            <a:r>
+              <a:rPr sz="1100" b="1" spc="-11" dirty="0">
+                <a:solidFill>
+                  <a:prstClr val="black"/>
+                </a:solidFill>
+                <a:latin typeface="Cambria"/>
+                <a:cs typeface="Cambria"/>
+              </a:rPr>
+              <a:t> </a:t>
+            </a:r>
+            <a:r>
+              <a:rPr lang="en-US" sz="1100" b="1" dirty="0">
+                <a:solidFill>
+                  <a:prstClr val="black"/>
+                </a:solidFill>
+                <a:latin typeface="Cambria"/>
+                <a:cs typeface="Cambria"/>
+              </a:rPr>
+              <a:t>©</a:t>
+            </a:r>
+            <a:r>
+              <a:rPr lang="en-US" sz="1100" b="1" spc="8" dirty="0">
+                <a:solidFill>
+                  <a:prstClr val="black"/>
+                </a:solidFill>
+                <a:latin typeface="Cambria"/>
+                <a:cs typeface="Cambria"/>
+              </a:rPr>
+              <a:t> </a:t>
+            </a:r>
+            <a:r>
+              <a:rPr lang="en-US" sz="1100" b="1" spc="-8" dirty="0">
+                <a:solidFill>
+                  <a:prstClr val="black"/>
+                </a:solidFill>
+                <a:latin typeface="Cambria"/>
+                <a:cs typeface="Cambria"/>
+                <a:hlinkClick r:id="rId2"/>
+              </a:rPr>
+              <a:t>ComplianceIQ</a:t>
+            </a:r>
+            <a:r>
+              <a:rPr sz="1100" b="1" spc="-8" dirty="0">
+                <a:solidFill>
+                  <a:prstClr val="black"/>
+                </a:solidFill>
+                <a:latin typeface="Cambria"/>
+                <a:cs typeface="Cambria"/>
+              </a:rPr>
+              <a:t>.</a:t>
+            </a:r>
+            <a:r>
+              <a:rPr sz="1100" b="1" spc="4" dirty="0">
+                <a:solidFill>
+                  <a:prstClr val="black"/>
+                </a:solidFill>
+                <a:latin typeface="Cambria"/>
+                <a:cs typeface="Cambria"/>
+              </a:rPr>
+              <a:t> </a:t>
+            </a:r>
+            <a:r>
+              <a:rPr lang="en-US" sz="1100" b="1" spc="4" dirty="0">
+                <a:solidFill>
+                  <a:prstClr val="black"/>
+                </a:solidFill>
+                <a:latin typeface="Cambria"/>
+                <a:cs typeface="Cambria"/>
+              </a:rPr>
+              <a:t> </a:t>
+            </a:r>
+            <a:r>
+              <a:rPr sz="1100" b="1" spc="-4" dirty="0">
+                <a:solidFill>
+                  <a:prstClr val="black"/>
+                </a:solidFill>
+                <a:latin typeface="Cambria"/>
+                <a:cs typeface="Cambria"/>
+              </a:rPr>
+              <a:t>All</a:t>
+            </a:r>
+            <a:r>
+              <a:rPr sz="1100" b="1" spc="11" dirty="0">
+                <a:solidFill>
+                  <a:prstClr val="black"/>
+                </a:solidFill>
+                <a:latin typeface="Cambria"/>
+                <a:cs typeface="Cambria"/>
+              </a:rPr>
+              <a:t> </a:t>
+            </a:r>
+            <a:r>
+              <a:rPr sz="1100" b="1" spc="-4" dirty="0">
+                <a:solidFill>
+                  <a:prstClr val="black"/>
+                </a:solidFill>
+                <a:latin typeface="Cambria"/>
+                <a:cs typeface="Cambria"/>
+              </a:rPr>
+              <a:t>Rights</a:t>
+            </a:r>
+            <a:r>
+              <a:rPr sz="1100" b="1" dirty="0">
+                <a:solidFill>
+                  <a:prstClr val="black"/>
+                </a:solidFill>
+                <a:latin typeface="Cambria"/>
+                <a:cs typeface="Cambria"/>
+              </a:rPr>
+              <a:t> </a:t>
+            </a:r>
+            <a:r>
+              <a:rPr sz="1100" b="1" spc="-8" dirty="0">
+                <a:solidFill>
+                  <a:prstClr val="black"/>
+                </a:solidFill>
+                <a:latin typeface="Cambria"/>
+                <a:cs typeface="Cambria"/>
+              </a:rPr>
+              <a:t>Reserved</a:t>
+            </a:r>
+            <a:r>
+              <a:rPr lang="en-US" sz="1100" b="1" spc="-8" dirty="0">
+                <a:solidFill>
+                  <a:prstClr val="black"/>
+                </a:solidFill>
+                <a:latin typeface="Cambria"/>
+                <a:cs typeface="Cambria"/>
+              </a:rPr>
+              <a:t>.</a:t>
+            </a:r>
+            <a:endParaRPr sz="1100" dirty="0">
+              <a:solidFill>
+                <a:prstClr val="black"/>
+              </a:solidFill>
+              <a:latin typeface="Cambria"/>
+              <a:cs typeface="Cambria"/>
+            </a:endParaRPr>
+          </a:p>
+        </p:txBody>
+      </p:sp>
+      <p:pic>
+        <p:nvPicPr>
+          <p:cNvPr id="3" name="object 5">
+            <a:hlinkClick r:id="rId2"/>
+            <a:extLst>
+              <a:ext uri="{FF2B5EF4-FFF2-40B4-BE49-F238E27FC236}">
+                <a16:creationId xmlns:a16="http://schemas.microsoft.com/office/drawing/2014/main" id="{68E5E6A5-236B-3044-989A-504C4EC1FB60}"/>
+              </a:ext>
+            </a:extLst>
+          </p:cNvPr>
+          <p:cNvPicPr/>
+          <p:nvPr/>
+        </p:nvPicPr>
+        <p:blipFill>
+          <a:blip r:embed="rId3" cstate="print"/>
+          <a:stretch>
+            <a:fillRect/>
+          </a:stretch>
+        </p:blipFill>
+        <p:spPr>
+          <a:xfrm>
+            <a:off x="9220201" y="0"/>
+            <a:ext cx="2941320" cy="685800"/>
+          </a:xfrm>
+          <a:prstGeom prst="rect">
+            <a:avLst/>
+          </a:prstGeom>
+        </p:spPr>
+      </p:pic>
     </p:spTree>
-    <p:extLst>
-      <p:ext uri="{BB962C8B-B14F-4D97-AF65-F5344CB8AC3E}">
-        <p14:creationId xmlns:p14="http://schemas.microsoft.com/office/powerpoint/2010/main" val="1826476565"/>
-      </p:ext>
-    </p:extLst>
   </p:cSld>
   <p:clrMapOvr>
     <a:masterClrMapping/>
@@ -4038,15 +7173,15 @@
           <p:cNvPr id="2" name="Title 1">
             <a:extLst>
               <a:ext uri="{FF2B5EF4-FFF2-40B4-BE49-F238E27FC236}">
-                <a16:creationId xmlns:a16="http://schemas.microsoft.com/office/drawing/2014/main" id="{2ED49078-63A5-9100-36B1-07137ED4405E}"/>
-              </a:ext>
-            </a:extLst>
-          </p:cNvPr>
-          <p:cNvSpPr>
-            <a:spLocks noGrp="1"/>
-          </p:cNvSpPr>
-          <p:nvPr>
-            <p:ph type="title"/>
+                <a16:creationId xmlns:a16="http://schemas.microsoft.com/office/drawing/2014/main" id="{9E900875-D9BF-4CEE-F6E3-6D77D097AF74}"/>
+              </a:ext>
+            </a:extLst>
+          </p:cNvPr>
+          <p:cNvSpPr>
+            <a:spLocks noGrp="1"/>
+          </p:cNvSpPr>
+          <p:nvPr>
+            <p:ph type="ctrTitle"/>
           </p:nvPr>
         </p:nvSpPr>
         <p:spPr/>
@@ -4056,30 +7191,25 @@
           <a:p>
             <a:r>
               <a:rPr lang="en-US" dirty="0"/>
-              <a:t>Understanding the Python in Excel </a:t>
-            </a:r>
-            <a:r>
-              <a:rPr lang="en-US" dirty="0" err="1"/>
-              <a:t>Environmnt</a:t>
-            </a:r>
-            <a:endParaRPr lang="en-US" dirty="0"/>
-          </a:p>
-        </p:txBody>
-      </p:sp>
-      <p:sp>
-        <p:nvSpPr>
-          <p:cNvPr id="3" name="Content Placeholder 2">
-            <a:extLst>
-              <a:ext uri="{FF2B5EF4-FFF2-40B4-BE49-F238E27FC236}">
-                <a16:creationId xmlns:a16="http://schemas.microsoft.com/office/drawing/2014/main" id="{854056A9-D9C7-2F36-95B9-B925305854D7}"/>
-              </a:ext>
-            </a:extLst>
-          </p:cNvPr>
-          <p:cNvSpPr>
-            <a:spLocks noGrp="1"/>
-          </p:cNvSpPr>
-          <p:nvPr>
-            <p:ph idx="1"/>
+              <a:t>Introduction to Python in Excel</a:t>
+            </a:r>
+          </a:p>
+        </p:txBody>
+      </p:sp>
+      <p:sp>
+        <p:nvSpPr>
+          <p:cNvPr id="3" name="Subtitle 2">
+            <a:extLst>
+              <a:ext uri="{FF2B5EF4-FFF2-40B4-BE49-F238E27FC236}">
+                <a16:creationId xmlns:a16="http://schemas.microsoft.com/office/drawing/2014/main" id="{E029AB0E-B081-72D8-43A2-2A4F7F4695FB}"/>
+              </a:ext>
+            </a:extLst>
+          </p:cNvPr>
+          <p:cNvSpPr>
+            <a:spLocks noGrp="1"/>
+          </p:cNvSpPr>
+          <p:nvPr>
+            <p:ph type="subTitle" idx="1"/>
           </p:nvPr>
         </p:nvSpPr>
         <p:spPr/>
@@ -4087,41 +7217,14 @@
           <a:bodyPr/>
           <a:lstStyle/>
           <a:p>
-            <a:r>
-              <a:rPr lang="en-US" dirty="0"/>
-              <a:t>What packages are available and why?</a:t>
-            </a:r>
-          </a:p>
-          <a:p>
-            <a:r>
-              <a:rPr lang="en-US" dirty="0"/>
-              <a:t>Loading Excel data into Python</a:t>
-            </a:r>
-          </a:p>
-          <a:p>
-            <a:r>
-              <a:rPr lang="en-US" dirty="0"/>
-              <a:t>Crossing between Python objects and Excel values</a:t>
-            </a:r>
-          </a:p>
-          <a:p>
-            <a:r>
-              <a:rPr lang="en-US" dirty="0"/>
-              <a:t>File: pie-environment.xlsx</a:t>
-            </a:r>
-          </a:p>
-          <a:p>
-            <a:pPr marL="0" indent="0">
-              <a:buNone/>
-            </a:pPr>
-            <a:endParaRPr lang="en-US" dirty="0"/>
+            <a:endParaRPr lang="en-US"/>
           </a:p>
         </p:txBody>
       </p:sp>
     </p:spTree>
     <p:extLst>
       <p:ext uri="{BB962C8B-B14F-4D97-AF65-F5344CB8AC3E}">
-        <p14:creationId xmlns:p14="http://schemas.microsoft.com/office/powerpoint/2010/main" val="152537769"/>
+        <p14:creationId xmlns:p14="http://schemas.microsoft.com/office/powerpoint/2010/main" val="2861766135"/>
       </p:ext>
     </p:extLst>
   </p:cSld>
@@ -4153,7 +7256,7 @@
           <p:cNvPr id="2" name="Title 1">
             <a:extLst>
               <a:ext uri="{FF2B5EF4-FFF2-40B4-BE49-F238E27FC236}">
-                <a16:creationId xmlns:a16="http://schemas.microsoft.com/office/drawing/2014/main" id="{C89A86A8-D827-A3FC-3831-049A84BCB902}"/>
+                <a16:creationId xmlns:a16="http://schemas.microsoft.com/office/drawing/2014/main" id="{2ED49078-63A5-9100-36B1-07137ED4405E}"/>
               </a:ext>
             </a:extLst>
           </p:cNvPr>
@@ -4171,25 +7274,25 @@
           <a:p>
             <a:r>
               <a:rPr lang="en-US" dirty="0"/>
-              <a:t>2. From “that’s hard in Excel” to “that’s easy in Python”</a:t>
-            </a:r>
-          </a:p>
-        </p:txBody>
-      </p:sp>
-      <p:sp>
-        <p:nvSpPr>
-          <p:cNvPr id="3" name="Text Placeholder 2">
-            <a:extLst>
-              <a:ext uri="{FF2B5EF4-FFF2-40B4-BE49-F238E27FC236}">
-                <a16:creationId xmlns:a16="http://schemas.microsoft.com/office/drawing/2014/main" id="{7EAF59A2-2EF5-F223-5C98-977ABC7E3480}"/>
-              </a:ext>
-            </a:extLst>
-          </p:cNvPr>
-          <p:cNvSpPr>
-            <a:spLocks noGrp="1"/>
-          </p:cNvSpPr>
-          <p:nvPr>
-            <p:ph type="body" idx="1"/>
+              <a:t>Objectives for this session</a:t>
+            </a:r>
+          </a:p>
+        </p:txBody>
+      </p:sp>
+      <p:sp>
+        <p:nvSpPr>
+          <p:cNvPr id="3" name="Content Placeholder 2">
+            <a:extLst>
+              <a:ext uri="{FF2B5EF4-FFF2-40B4-BE49-F238E27FC236}">
+                <a16:creationId xmlns:a16="http://schemas.microsoft.com/office/drawing/2014/main" id="{854056A9-D9C7-2F36-95B9-B925305854D7}"/>
+              </a:ext>
+            </a:extLst>
+          </p:cNvPr>
+          <p:cNvSpPr>
+            <a:spLocks noGrp="1"/>
+          </p:cNvSpPr>
+          <p:nvPr>
+            <p:ph idx="1"/>
           </p:nvPr>
         </p:nvSpPr>
         <p:spPr/>
@@ -4197,14 +7300,32 @@
           <a:bodyPr/>
           <a:lstStyle/>
           <a:p>
-            <a:endParaRPr lang="en-US"/>
+            <a:r>
+              <a:rPr lang="en-US" dirty="0"/>
+              <a:t>Understand the Python in Excel environment</a:t>
+            </a:r>
+          </a:p>
+          <a:p>
+            <a:r>
+              <a:rPr lang="en-US" dirty="0"/>
+              <a:t>Create analyses and visualizations that would otherwise be difficult in Excel</a:t>
+            </a:r>
+          </a:p>
+          <a:p>
+            <a:r>
+              <a:rPr lang="en-US" dirty="0"/>
+              <a:t>Explore what is and isn’t possible with current integration</a:t>
+            </a:r>
+          </a:p>
+          <a:p>
+            <a:endParaRPr lang="en-US" dirty="0"/>
           </a:p>
         </p:txBody>
       </p:sp>
     </p:spTree>
     <p:extLst>
       <p:ext uri="{BB962C8B-B14F-4D97-AF65-F5344CB8AC3E}">
-        <p14:creationId xmlns:p14="http://schemas.microsoft.com/office/powerpoint/2010/main" val="2436049718"/>
+        <p14:creationId xmlns:p14="http://schemas.microsoft.com/office/powerpoint/2010/main" val="3698758899"/>
       </p:ext>
     </p:extLst>
   </p:cSld>
@@ -4236,7 +7357,7 @@
           <p:cNvPr id="2" name="Title 1">
             <a:extLst>
               <a:ext uri="{FF2B5EF4-FFF2-40B4-BE49-F238E27FC236}">
-                <a16:creationId xmlns:a16="http://schemas.microsoft.com/office/drawing/2014/main" id="{2ED49078-63A5-9100-36B1-07137ED4405E}"/>
+                <a16:creationId xmlns:a16="http://schemas.microsoft.com/office/drawing/2014/main" id="{C89A86A8-D827-A3FC-3831-049A84BCB902}"/>
               </a:ext>
             </a:extLst>
           </p:cNvPr>
@@ -4254,25 +7375,25 @@
           <a:p>
             <a:r>
               <a:rPr lang="en-US" dirty="0"/>
-              <a:t>From “that’s hard in Excel” to “that’s easy in Python”</a:t>
-            </a:r>
-          </a:p>
-        </p:txBody>
-      </p:sp>
-      <p:sp>
-        <p:nvSpPr>
-          <p:cNvPr id="3" name="Content Placeholder 2">
-            <a:extLst>
-              <a:ext uri="{FF2B5EF4-FFF2-40B4-BE49-F238E27FC236}">
-                <a16:creationId xmlns:a16="http://schemas.microsoft.com/office/drawing/2014/main" id="{854056A9-D9C7-2F36-95B9-B925305854D7}"/>
-              </a:ext>
-            </a:extLst>
-          </p:cNvPr>
-          <p:cNvSpPr>
-            <a:spLocks noGrp="1"/>
-          </p:cNvSpPr>
-          <p:nvPr>
-            <p:ph idx="1"/>
+              <a:t>1. Understanding the Python in Excel environment</a:t>
+            </a:r>
+          </a:p>
+        </p:txBody>
+      </p:sp>
+      <p:sp>
+        <p:nvSpPr>
+          <p:cNvPr id="3" name="Text Placeholder 2">
+            <a:extLst>
+              <a:ext uri="{FF2B5EF4-FFF2-40B4-BE49-F238E27FC236}">
+                <a16:creationId xmlns:a16="http://schemas.microsoft.com/office/drawing/2014/main" id="{7EAF59A2-2EF5-F223-5C98-977ABC7E3480}"/>
+              </a:ext>
+            </a:extLst>
+          </p:cNvPr>
+          <p:cNvSpPr>
+            <a:spLocks noGrp="1"/>
+          </p:cNvSpPr>
+          <p:nvPr>
+            <p:ph type="body" idx="1"/>
           </p:nvPr>
         </p:nvSpPr>
         <p:spPr/>
@@ -4280,38 +7401,14 @@
           <a:bodyPr/>
           <a:lstStyle/>
           <a:p>
-            <a:r>
-              <a:rPr lang="en-US" dirty="0"/>
-              <a:t>Data profiling: What is the shape, size, completeness?</a:t>
-            </a:r>
-          </a:p>
-          <a:p>
-            <a:r>
-              <a:rPr lang="en-US" dirty="0"/>
-              <a:t>Time series: pandas for panel data</a:t>
-            </a:r>
-          </a:p>
-          <a:p>
-            <a:r>
-              <a:rPr lang="en-US" dirty="0"/>
-              <a:t>Visualizations: What are the distributions and relationships in this data?</a:t>
-            </a:r>
-          </a:p>
-          <a:p>
-            <a:endParaRPr lang="en-US" dirty="0"/>
-          </a:p>
-          <a:p>
-            <a:r>
-              <a:rPr lang="en-US" dirty="0"/>
-              <a:t>File: hard-excel-easy-python.xlsx</a:t>
-            </a:r>
+            <a:endParaRPr lang="en-US"/>
           </a:p>
         </p:txBody>
       </p:sp>
     </p:spTree>
     <p:extLst>
       <p:ext uri="{BB962C8B-B14F-4D97-AF65-F5344CB8AC3E}">
-        <p14:creationId xmlns:p14="http://schemas.microsoft.com/office/powerpoint/2010/main" val="2219271634"/>
+        <p14:creationId xmlns:p14="http://schemas.microsoft.com/office/powerpoint/2010/main" val="1826476565"/>
       </p:ext>
     </p:extLst>
   </p:cSld>
@@ -4343,7 +7440,7 @@
           <p:cNvPr id="2" name="Title 1">
             <a:extLst>
               <a:ext uri="{FF2B5EF4-FFF2-40B4-BE49-F238E27FC236}">
-                <a16:creationId xmlns:a16="http://schemas.microsoft.com/office/drawing/2014/main" id="{C89A86A8-D827-A3FC-3831-049A84BCB902}"/>
+                <a16:creationId xmlns:a16="http://schemas.microsoft.com/office/drawing/2014/main" id="{2ED49078-63A5-9100-36B1-07137ED4405E}"/>
               </a:ext>
             </a:extLst>
           </p:cNvPr>
@@ -4361,25 +7458,30 @@
           <a:p>
             <a:r>
               <a:rPr lang="en-US" dirty="0"/>
-              <a:t>3. There’s more to Python and Excel than Python in Excel</a:t>
-            </a:r>
-          </a:p>
-        </p:txBody>
-      </p:sp>
-      <p:sp>
-        <p:nvSpPr>
-          <p:cNvPr id="3" name="Text Placeholder 2">
-            <a:extLst>
-              <a:ext uri="{FF2B5EF4-FFF2-40B4-BE49-F238E27FC236}">
-                <a16:creationId xmlns:a16="http://schemas.microsoft.com/office/drawing/2014/main" id="{7EAF59A2-2EF5-F223-5C98-977ABC7E3480}"/>
-              </a:ext>
-            </a:extLst>
-          </p:cNvPr>
-          <p:cNvSpPr>
-            <a:spLocks noGrp="1"/>
-          </p:cNvSpPr>
-          <p:nvPr>
-            <p:ph type="body" idx="1"/>
+              <a:t>Understanding the Python in Excel </a:t>
+            </a:r>
+            <a:r>
+              <a:rPr lang="en-US" dirty="0" err="1"/>
+              <a:t>Environmnt</a:t>
+            </a:r>
+            <a:endParaRPr lang="en-US" dirty="0"/>
+          </a:p>
+        </p:txBody>
+      </p:sp>
+      <p:sp>
+        <p:nvSpPr>
+          <p:cNvPr id="3" name="Content Placeholder 2">
+            <a:extLst>
+              <a:ext uri="{FF2B5EF4-FFF2-40B4-BE49-F238E27FC236}">
+                <a16:creationId xmlns:a16="http://schemas.microsoft.com/office/drawing/2014/main" id="{854056A9-D9C7-2F36-95B9-B925305854D7}"/>
+              </a:ext>
+            </a:extLst>
+          </p:cNvPr>
+          <p:cNvSpPr>
+            <a:spLocks noGrp="1"/>
+          </p:cNvSpPr>
+          <p:nvPr>
+            <p:ph idx="1"/>
           </p:nvPr>
         </p:nvSpPr>
         <p:spPr/>
@@ -4387,14 +7489,41 @@
           <a:bodyPr/>
           <a:lstStyle/>
           <a:p>
-            <a:endParaRPr lang="en-US"/>
+            <a:r>
+              <a:rPr lang="en-US" dirty="0"/>
+              <a:t>What packages are available and why?</a:t>
+            </a:r>
+          </a:p>
+          <a:p>
+            <a:r>
+              <a:rPr lang="en-US" dirty="0"/>
+              <a:t>Loading Excel data into Python</a:t>
+            </a:r>
+          </a:p>
+          <a:p>
+            <a:r>
+              <a:rPr lang="en-US" dirty="0"/>
+              <a:t>Crossing between Python objects and Excel values</a:t>
+            </a:r>
+          </a:p>
+          <a:p>
+            <a:r>
+              <a:rPr lang="en-US" dirty="0"/>
+              <a:t>File: pie-environment.xlsx</a:t>
+            </a:r>
+          </a:p>
+          <a:p>
+            <a:pPr marL="0" indent="0">
+              <a:buNone/>
+            </a:pPr>
+            <a:endParaRPr lang="en-US" dirty="0"/>
           </a:p>
         </p:txBody>
       </p:sp>
     </p:spTree>
     <p:extLst>
       <p:ext uri="{BB962C8B-B14F-4D97-AF65-F5344CB8AC3E}">
-        <p14:creationId xmlns:p14="http://schemas.microsoft.com/office/powerpoint/2010/main" val="3580814116"/>
+        <p14:creationId xmlns:p14="http://schemas.microsoft.com/office/powerpoint/2010/main" val="152537769"/>
       </p:ext>
     </p:extLst>
   </p:cSld>
@@ -4426,7 +7555,7 @@
           <p:cNvPr id="2" name="Title 1">
             <a:extLst>
               <a:ext uri="{FF2B5EF4-FFF2-40B4-BE49-F238E27FC236}">
-                <a16:creationId xmlns:a16="http://schemas.microsoft.com/office/drawing/2014/main" id="{2ED49078-63A5-9100-36B1-07137ED4405E}"/>
+                <a16:creationId xmlns:a16="http://schemas.microsoft.com/office/drawing/2014/main" id="{C89A86A8-D827-A3FC-3831-049A84BCB902}"/>
               </a:ext>
             </a:extLst>
           </p:cNvPr>
@@ -4444,25 +7573,25 @@
           <a:p>
             <a:r>
               <a:rPr lang="en-US" dirty="0"/>
-              <a:t>There’s more to Python and Excel than Python in Excel</a:t>
-            </a:r>
-          </a:p>
-        </p:txBody>
-      </p:sp>
-      <p:sp>
-        <p:nvSpPr>
-          <p:cNvPr id="3" name="Content Placeholder 2">
-            <a:extLst>
-              <a:ext uri="{FF2B5EF4-FFF2-40B4-BE49-F238E27FC236}">
-                <a16:creationId xmlns:a16="http://schemas.microsoft.com/office/drawing/2014/main" id="{854056A9-D9C7-2F36-95B9-B925305854D7}"/>
-              </a:ext>
-            </a:extLst>
-          </p:cNvPr>
-          <p:cNvSpPr>
-            <a:spLocks noGrp="1"/>
-          </p:cNvSpPr>
-          <p:nvPr>
-            <p:ph idx="1"/>
+              <a:t>2. From “that’s hard in Excel” to “that’s easy in Python”</a:t>
+            </a:r>
+          </a:p>
+        </p:txBody>
+      </p:sp>
+      <p:sp>
+        <p:nvSpPr>
+          <p:cNvPr id="3" name="Text Placeholder 2">
+            <a:extLst>
+              <a:ext uri="{FF2B5EF4-FFF2-40B4-BE49-F238E27FC236}">
+                <a16:creationId xmlns:a16="http://schemas.microsoft.com/office/drawing/2014/main" id="{7EAF59A2-2EF5-F223-5C98-977ABC7E3480}"/>
+              </a:ext>
+            </a:extLst>
+          </p:cNvPr>
+          <p:cNvSpPr>
+            <a:spLocks noGrp="1"/>
+          </p:cNvSpPr>
+          <p:nvPr>
+            <p:ph type="body" idx="1"/>
           </p:nvPr>
         </p:nvSpPr>
         <p:spPr/>
@@ -4470,40 +7599,14 @@
           <a:bodyPr/>
           <a:lstStyle/>
           <a:p>
-            <a:r>
-              <a:rPr lang="en-US" dirty="0"/>
-              <a:t>Python in Excel is all about data analysis, visualization, statistics &amp; ML</a:t>
-            </a:r>
-          </a:p>
-          <a:p>
-            <a:r>
-              <a:rPr lang="en-US" dirty="0"/>
-              <a:t>It lacks Excel automation capabilities</a:t>
-            </a:r>
-          </a:p>
-          <a:p>
-            <a:r>
-              <a:rPr lang="en-US" dirty="0"/>
-              <a:t>You can automate an entire Excel workbook from Python… without opening Excel!</a:t>
-            </a:r>
-          </a:p>
-          <a:p>
-            <a:r>
-              <a:rPr lang="en-US" dirty="0"/>
-              <a:t>File: </a:t>
-            </a:r>
-            <a:r>
-              <a:rPr lang="en-US" dirty="0" err="1"/>
-              <a:t>pae-pie.ipynb</a:t>
-            </a:r>
-            <a:endParaRPr lang="en-US" dirty="0"/>
+            <a:endParaRPr lang="en-US"/>
           </a:p>
         </p:txBody>
       </p:sp>
     </p:spTree>
     <p:extLst>
       <p:ext uri="{BB962C8B-B14F-4D97-AF65-F5344CB8AC3E}">
-        <p14:creationId xmlns:p14="http://schemas.microsoft.com/office/powerpoint/2010/main" val="3454268131"/>
+        <p14:creationId xmlns:p14="http://schemas.microsoft.com/office/powerpoint/2010/main" val="2436049718"/>
       </p:ext>
     </p:extLst>
   </p:cSld>
@@ -4535,7 +7638,7 @@
           <p:cNvPr id="2" name="Title 1">
             <a:extLst>
               <a:ext uri="{FF2B5EF4-FFF2-40B4-BE49-F238E27FC236}">
-                <a16:creationId xmlns:a16="http://schemas.microsoft.com/office/drawing/2014/main" id="{C89A86A8-D827-A3FC-3831-049A84BCB902}"/>
+                <a16:creationId xmlns:a16="http://schemas.microsoft.com/office/drawing/2014/main" id="{2ED49078-63A5-9100-36B1-07137ED4405E}"/>
               </a:ext>
             </a:extLst>
           </p:cNvPr>
@@ -4553,33 +7656,25 @@
           <a:p>
             <a:r>
               <a:rPr lang="en-US" dirty="0"/>
-              <a:t>What questions do you </a:t>
-            </a:r>
-            <a:r>
-              <a:rPr lang="en-US" dirty="0" err="1"/>
-              <a:t>hav</a:t>
-            </a:r>
-            <a:r>
-              <a:rPr lang="en-US" dirty="0"/>
-              <a:t>? </a:t>
-            </a:r>
-          </a:p>
-        </p:txBody>
-      </p:sp>
-      <p:sp>
-        <p:nvSpPr>
-          <p:cNvPr id="3" name="Text Placeholder 2">
-            <a:extLst>
-              <a:ext uri="{FF2B5EF4-FFF2-40B4-BE49-F238E27FC236}">
-                <a16:creationId xmlns:a16="http://schemas.microsoft.com/office/drawing/2014/main" id="{7EAF59A2-2EF5-F223-5C98-977ABC7E3480}"/>
-              </a:ext>
-            </a:extLst>
-          </p:cNvPr>
-          <p:cNvSpPr>
-            <a:spLocks noGrp="1"/>
-          </p:cNvSpPr>
-          <p:nvPr>
-            <p:ph type="body" idx="1"/>
+              <a:t>From “that’s hard in Excel” to “that’s easy in Python”</a:t>
+            </a:r>
+          </a:p>
+        </p:txBody>
+      </p:sp>
+      <p:sp>
+        <p:nvSpPr>
+          <p:cNvPr id="3" name="Content Placeholder 2">
+            <a:extLst>
+              <a:ext uri="{FF2B5EF4-FFF2-40B4-BE49-F238E27FC236}">
+                <a16:creationId xmlns:a16="http://schemas.microsoft.com/office/drawing/2014/main" id="{854056A9-D9C7-2F36-95B9-B925305854D7}"/>
+              </a:ext>
+            </a:extLst>
+          </p:cNvPr>
+          <p:cNvSpPr>
+            <a:spLocks noGrp="1"/>
+          </p:cNvSpPr>
+          <p:nvPr>
+            <p:ph idx="1"/>
           </p:nvPr>
         </p:nvSpPr>
         <p:spPr/>
@@ -4587,14 +7682,38 @@
           <a:bodyPr/>
           <a:lstStyle/>
           <a:p>
-            <a:endParaRPr lang="en-US"/>
+            <a:r>
+              <a:rPr lang="en-US" dirty="0"/>
+              <a:t>Data profiling: What is the shape, size, completeness?</a:t>
+            </a:r>
+          </a:p>
+          <a:p>
+            <a:r>
+              <a:rPr lang="en-US" dirty="0"/>
+              <a:t>Time series: pandas for panel data</a:t>
+            </a:r>
+          </a:p>
+          <a:p>
+            <a:r>
+              <a:rPr lang="en-US" dirty="0"/>
+              <a:t>Visualizations: What are the distributions and relationships in this data?</a:t>
+            </a:r>
+          </a:p>
+          <a:p>
+            <a:endParaRPr lang="en-US" dirty="0"/>
+          </a:p>
+          <a:p>
+            <a:r>
+              <a:rPr lang="en-US" dirty="0"/>
+              <a:t>File: hard-excel-easy-python.xlsx</a:t>
+            </a:r>
           </a:p>
         </p:txBody>
       </p:sp>
     </p:spTree>
     <p:extLst>
       <p:ext uri="{BB962C8B-B14F-4D97-AF65-F5344CB8AC3E}">
-        <p14:creationId xmlns:p14="http://schemas.microsoft.com/office/powerpoint/2010/main" val="1000993273"/>
+        <p14:creationId xmlns:p14="http://schemas.microsoft.com/office/powerpoint/2010/main" val="2219271634"/>
       </p:ext>
     </p:extLst>
   </p:cSld>

</xml_diff>